<commit_message>
intro, motivation, literature survey
</commit_message>
<xml_diff>
--- a/Major_Project_Review_1.pptx
+++ b/Major_Project_Review_1.pptx
@@ -4,6 +4,9 @@
   <p:sldMasterIdLst>
     <p:sldMasterId id="2147483678" r:id="rId1"/>
   </p:sldMasterIdLst>
+  <p:notesMasterIdLst>
+    <p:notesMasterId r:id="rId11"/>
+  </p:notesMasterIdLst>
   <p:sldIdLst>
     <p:sldId id="256" r:id="rId2"/>
     <p:sldId id="257" r:id="rId3"/>
@@ -112,7 +115,450 @@
       </a:defRPr>
     </a:lvl9pPr>
   </p:defaultTextStyle>
+  <p:extLst>
+    <p:ext uri="{EFAFB233-063F-42B5-8137-9DF3F51BA10A}">
+      <p15:sldGuideLst xmlns:p15="http://schemas.microsoft.com/office/powerpoint/2012/main"/>
+    </p:ext>
+  </p:extLst>
 </p:presentation>
+</file>
+
+<file path=ppt/notesMasters/notesMaster1.xml><?xml version="1.0" encoding="utf-8"?>
+<p:notesMaster xmlns:a="http://schemas.openxmlformats.org/drawingml/2006/main" xmlns:r="http://schemas.openxmlformats.org/officeDocument/2006/relationships" xmlns:p="http://schemas.openxmlformats.org/presentationml/2006/main">
+  <p:cSld>
+    <p:bg>
+      <p:bgRef idx="1001">
+        <a:schemeClr val="bg1"/>
+      </p:bgRef>
+    </p:bg>
+    <p:spTree>
+      <p:nvGrpSpPr>
+        <p:cNvPr id="1" name=""/>
+        <p:cNvGrpSpPr/>
+        <p:nvPr/>
+      </p:nvGrpSpPr>
+      <p:grpSpPr>
+        <a:xfrm>
+          <a:off x="0" y="0"/>
+          <a:ext cx="0" cy="0"/>
+          <a:chOff x="0" y="0"/>
+          <a:chExt cx="0" cy="0"/>
+        </a:xfrm>
+      </p:grpSpPr>
+      <p:sp>
+        <p:nvSpPr>
+          <p:cNvPr id="2" name="Header Placeholder 1"/>
+          <p:cNvSpPr>
+            <a:spLocks noGrp="1"/>
+          </p:cNvSpPr>
+          <p:nvPr>
+            <p:ph type="hdr" sz="quarter"/>
+          </p:nvPr>
+        </p:nvSpPr>
+        <p:spPr>
+          <a:xfrm>
+            <a:off x="0" y="0"/>
+            <a:ext cx="2971800" cy="458788"/>
+          </a:xfrm>
+          <a:prstGeom prst="rect">
+            <a:avLst/>
+          </a:prstGeom>
+        </p:spPr>
+        <p:txBody>
+          <a:bodyPr vert="horz" lIns="91440" tIns="45720" rIns="91440" bIns="45720" rtlCol="0"/>
+          <a:lstStyle>
+            <a:lvl1pPr algn="l">
+              <a:defRPr sz="1200"/>
+            </a:lvl1pPr>
+          </a:lstStyle>
+          <a:p>
+            <a:endParaRPr lang="en-IN"/>
+          </a:p>
+        </p:txBody>
+      </p:sp>
+      <p:sp>
+        <p:nvSpPr>
+          <p:cNvPr id="3" name="Date Placeholder 2"/>
+          <p:cNvSpPr>
+            <a:spLocks noGrp="1"/>
+          </p:cNvSpPr>
+          <p:nvPr>
+            <p:ph type="dt" idx="1"/>
+          </p:nvPr>
+        </p:nvSpPr>
+        <p:spPr>
+          <a:xfrm>
+            <a:off x="3884613" y="0"/>
+            <a:ext cx="2971800" cy="458788"/>
+          </a:xfrm>
+          <a:prstGeom prst="rect">
+            <a:avLst/>
+          </a:prstGeom>
+        </p:spPr>
+        <p:txBody>
+          <a:bodyPr vert="horz" lIns="91440" tIns="45720" rIns="91440" bIns="45720" rtlCol="0"/>
+          <a:lstStyle>
+            <a:lvl1pPr algn="r">
+              <a:defRPr sz="1200"/>
+            </a:lvl1pPr>
+          </a:lstStyle>
+          <a:p>
+            <a:fld id="{D5BBF475-32C9-4801-B200-59803DE05097}" type="datetimeFigureOut">
+              <a:rPr lang="en-IN" smtClean="0"/>
+              <a:t>09-01-2022</a:t>
+            </a:fld>
+            <a:endParaRPr lang="en-IN"/>
+          </a:p>
+        </p:txBody>
+      </p:sp>
+      <p:sp>
+        <p:nvSpPr>
+          <p:cNvPr id="4" name="Slide Image Placeholder 3"/>
+          <p:cNvSpPr>
+            <a:spLocks noGrp="1" noRot="1" noChangeAspect="1"/>
+          </p:cNvSpPr>
+          <p:nvPr>
+            <p:ph type="sldImg" idx="2"/>
+          </p:nvPr>
+        </p:nvSpPr>
+        <p:spPr>
+          <a:xfrm>
+            <a:off x="685800" y="1143000"/>
+            <a:ext cx="5486400" cy="3086100"/>
+          </a:xfrm>
+          <a:prstGeom prst="rect">
+            <a:avLst/>
+          </a:prstGeom>
+          <a:noFill/>
+          <a:ln w="12700">
+            <a:solidFill>
+              <a:prstClr val="black"/>
+            </a:solidFill>
+          </a:ln>
+        </p:spPr>
+        <p:txBody>
+          <a:bodyPr vert="horz" lIns="91440" tIns="45720" rIns="91440" bIns="45720" rtlCol="0" anchor="ctr"/>
+          <a:lstStyle/>
+          <a:p>
+            <a:endParaRPr lang="en-IN"/>
+          </a:p>
+        </p:txBody>
+      </p:sp>
+      <p:sp>
+        <p:nvSpPr>
+          <p:cNvPr id="5" name="Notes Placeholder 4"/>
+          <p:cNvSpPr>
+            <a:spLocks noGrp="1"/>
+          </p:cNvSpPr>
+          <p:nvPr>
+            <p:ph type="body" sz="quarter" idx="3"/>
+          </p:nvPr>
+        </p:nvSpPr>
+        <p:spPr>
+          <a:xfrm>
+            <a:off x="685800" y="4400550"/>
+            <a:ext cx="5486400" cy="3600450"/>
+          </a:xfrm>
+          <a:prstGeom prst="rect">
+            <a:avLst/>
+          </a:prstGeom>
+        </p:spPr>
+        <p:txBody>
+          <a:bodyPr vert="horz" lIns="91440" tIns="45720" rIns="91440" bIns="45720" rtlCol="0"/>
+          <a:lstStyle/>
+          <a:p>
+            <a:pPr lvl="0"/>
+            <a:r>
+              <a:rPr lang="en-US"/>
+              <a:t>Click to edit Master text styles</a:t>
+            </a:r>
+          </a:p>
+          <a:p>
+            <a:pPr lvl="1"/>
+            <a:r>
+              <a:rPr lang="en-US"/>
+              <a:t>Second level</a:t>
+            </a:r>
+          </a:p>
+          <a:p>
+            <a:pPr lvl="2"/>
+            <a:r>
+              <a:rPr lang="en-US"/>
+              <a:t>Third level</a:t>
+            </a:r>
+          </a:p>
+          <a:p>
+            <a:pPr lvl="3"/>
+            <a:r>
+              <a:rPr lang="en-US"/>
+              <a:t>Fourth level</a:t>
+            </a:r>
+          </a:p>
+          <a:p>
+            <a:pPr lvl="4"/>
+            <a:r>
+              <a:rPr lang="en-US"/>
+              <a:t>Fifth level</a:t>
+            </a:r>
+            <a:endParaRPr lang="en-IN"/>
+          </a:p>
+        </p:txBody>
+      </p:sp>
+      <p:sp>
+        <p:nvSpPr>
+          <p:cNvPr id="6" name="Footer Placeholder 5"/>
+          <p:cNvSpPr>
+            <a:spLocks noGrp="1"/>
+          </p:cNvSpPr>
+          <p:nvPr>
+            <p:ph type="ftr" sz="quarter" idx="4"/>
+          </p:nvPr>
+        </p:nvSpPr>
+        <p:spPr>
+          <a:xfrm>
+            <a:off x="0" y="8685213"/>
+            <a:ext cx="2971800" cy="458787"/>
+          </a:xfrm>
+          <a:prstGeom prst="rect">
+            <a:avLst/>
+          </a:prstGeom>
+        </p:spPr>
+        <p:txBody>
+          <a:bodyPr vert="horz" lIns="91440" tIns="45720" rIns="91440" bIns="45720" rtlCol="0" anchor="b"/>
+          <a:lstStyle>
+            <a:lvl1pPr algn="l">
+              <a:defRPr sz="1200"/>
+            </a:lvl1pPr>
+          </a:lstStyle>
+          <a:p>
+            <a:endParaRPr lang="en-IN"/>
+          </a:p>
+        </p:txBody>
+      </p:sp>
+      <p:sp>
+        <p:nvSpPr>
+          <p:cNvPr id="7" name="Slide Number Placeholder 6"/>
+          <p:cNvSpPr>
+            <a:spLocks noGrp="1"/>
+          </p:cNvSpPr>
+          <p:nvPr>
+            <p:ph type="sldNum" sz="quarter" idx="5"/>
+          </p:nvPr>
+        </p:nvSpPr>
+        <p:spPr>
+          <a:xfrm>
+            <a:off x="3884613" y="8685213"/>
+            <a:ext cx="2971800" cy="458787"/>
+          </a:xfrm>
+          <a:prstGeom prst="rect">
+            <a:avLst/>
+          </a:prstGeom>
+        </p:spPr>
+        <p:txBody>
+          <a:bodyPr vert="horz" lIns="91440" tIns="45720" rIns="91440" bIns="45720" rtlCol="0" anchor="b"/>
+          <a:lstStyle>
+            <a:lvl1pPr algn="r">
+              <a:defRPr sz="1200"/>
+            </a:lvl1pPr>
+          </a:lstStyle>
+          <a:p>
+            <a:fld id="{C718523B-6A04-4729-969A-C5867F038FBD}" type="slidenum">
+              <a:rPr lang="en-IN" smtClean="0"/>
+              <a:t>‹#›</a:t>
+            </a:fld>
+            <a:endParaRPr lang="en-IN"/>
+          </a:p>
+        </p:txBody>
+      </p:sp>
+    </p:spTree>
+    <p:extLst>
+      <p:ext uri="{BB962C8B-B14F-4D97-AF65-F5344CB8AC3E}">
+        <p14:creationId xmlns:p14="http://schemas.microsoft.com/office/powerpoint/2010/main" val="1877234114"/>
+      </p:ext>
+    </p:extLst>
+  </p:cSld>
+  <p:clrMap bg1="lt1" tx1="dk1" bg2="lt2" tx2="dk2" accent1="accent1" accent2="accent2" accent3="accent3" accent4="accent4" accent5="accent5" accent6="accent6" hlink="hlink" folHlink="folHlink"/>
+  <p:notesStyle>
+    <a:lvl1pPr marL="0" algn="l" defTabSz="914400" rtl="0" eaLnBrk="1" latinLnBrk="0" hangingPunct="1">
+      <a:defRPr sz="1200" kern="1200">
+        <a:solidFill>
+          <a:schemeClr val="tx1"/>
+        </a:solidFill>
+        <a:latin typeface="+mn-lt"/>
+        <a:ea typeface="+mn-ea"/>
+        <a:cs typeface="+mn-cs"/>
+      </a:defRPr>
+    </a:lvl1pPr>
+    <a:lvl2pPr marL="457200" algn="l" defTabSz="914400" rtl="0" eaLnBrk="1" latinLnBrk="0" hangingPunct="1">
+      <a:defRPr sz="1200" kern="1200">
+        <a:solidFill>
+          <a:schemeClr val="tx1"/>
+        </a:solidFill>
+        <a:latin typeface="+mn-lt"/>
+        <a:ea typeface="+mn-ea"/>
+        <a:cs typeface="+mn-cs"/>
+      </a:defRPr>
+    </a:lvl2pPr>
+    <a:lvl3pPr marL="914400" algn="l" defTabSz="914400" rtl="0" eaLnBrk="1" latinLnBrk="0" hangingPunct="1">
+      <a:defRPr sz="1200" kern="1200">
+        <a:solidFill>
+          <a:schemeClr val="tx1"/>
+        </a:solidFill>
+        <a:latin typeface="+mn-lt"/>
+        <a:ea typeface="+mn-ea"/>
+        <a:cs typeface="+mn-cs"/>
+      </a:defRPr>
+    </a:lvl3pPr>
+    <a:lvl4pPr marL="1371600" algn="l" defTabSz="914400" rtl="0" eaLnBrk="1" latinLnBrk="0" hangingPunct="1">
+      <a:defRPr sz="1200" kern="1200">
+        <a:solidFill>
+          <a:schemeClr val="tx1"/>
+        </a:solidFill>
+        <a:latin typeface="+mn-lt"/>
+        <a:ea typeface="+mn-ea"/>
+        <a:cs typeface="+mn-cs"/>
+      </a:defRPr>
+    </a:lvl4pPr>
+    <a:lvl5pPr marL="1828800" algn="l" defTabSz="914400" rtl="0" eaLnBrk="1" latinLnBrk="0" hangingPunct="1">
+      <a:defRPr sz="1200" kern="1200">
+        <a:solidFill>
+          <a:schemeClr val="tx1"/>
+        </a:solidFill>
+        <a:latin typeface="+mn-lt"/>
+        <a:ea typeface="+mn-ea"/>
+        <a:cs typeface="+mn-cs"/>
+      </a:defRPr>
+    </a:lvl5pPr>
+    <a:lvl6pPr marL="2286000" algn="l" defTabSz="914400" rtl="0" eaLnBrk="1" latinLnBrk="0" hangingPunct="1">
+      <a:defRPr sz="1200" kern="1200">
+        <a:solidFill>
+          <a:schemeClr val="tx1"/>
+        </a:solidFill>
+        <a:latin typeface="+mn-lt"/>
+        <a:ea typeface="+mn-ea"/>
+        <a:cs typeface="+mn-cs"/>
+      </a:defRPr>
+    </a:lvl6pPr>
+    <a:lvl7pPr marL="2743200" algn="l" defTabSz="914400" rtl="0" eaLnBrk="1" latinLnBrk="0" hangingPunct="1">
+      <a:defRPr sz="1200" kern="1200">
+        <a:solidFill>
+          <a:schemeClr val="tx1"/>
+        </a:solidFill>
+        <a:latin typeface="+mn-lt"/>
+        <a:ea typeface="+mn-ea"/>
+        <a:cs typeface="+mn-cs"/>
+      </a:defRPr>
+    </a:lvl7pPr>
+    <a:lvl8pPr marL="3200400" algn="l" defTabSz="914400" rtl="0" eaLnBrk="1" latinLnBrk="0" hangingPunct="1">
+      <a:defRPr sz="1200" kern="1200">
+        <a:solidFill>
+          <a:schemeClr val="tx1"/>
+        </a:solidFill>
+        <a:latin typeface="+mn-lt"/>
+        <a:ea typeface="+mn-ea"/>
+        <a:cs typeface="+mn-cs"/>
+      </a:defRPr>
+    </a:lvl8pPr>
+    <a:lvl9pPr marL="3657600" algn="l" defTabSz="914400" rtl="0" eaLnBrk="1" latinLnBrk="0" hangingPunct="1">
+      <a:defRPr sz="1200" kern="1200">
+        <a:solidFill>
+          <a:schemeClr val="tx1"/>
+        </a:solidFill>
+        <a:latin typeface="+mn-lt"/>
+        <a:ea typeface="+mn-ea"/>
+        <a:cs typeface="+mn-cs"/>
+      </a:defRPr>
+    </a:lvl9pPr>
+  </p:notesStyle>
+</p:notesMaster>
+</file>
+
+<file path=ppt/notesSlides/notesSlide1.xml><?xml version="1.0" encoding="utf-8"?>
+<p:notes xmlns:a="http://schemas.openxmlformats.org/drawingml/2006/main" xmlns:r="http://schemas.openxmlformats.org/officeDocument/2006/relationships" xmlns:p="http://schemas.openxmlformats.org/presentationml/2006/main">
+  <p:cSld>
+    <p:spTree>
+      <p:nvGrpSpPr>
+        <p:cNvPr id="1" name=""/>
+        <p:cNvGrpSpPr/>
+        <p:nvPr/>
+      </p:nvGrpSpPr>
+      <p:grpSpPr>
+        <a:xfrm>
+          <a:off x="0" y="0"/>
+          <a:ext cx="0" cy="0"/>
+          <a:chOff x="0" y="0"/>
+          <a:chExt cx="0" cy="0"/>
+        </a:xfrm>
+      </p:grpSpPr>
+      <p:sp>
+        <p:nvSpPr>
+          <p:cNvPr id="2" name="Slide Image Placeholder 1"/>
+          <p:cNvSpPr>
+            <a:spLocks noGrp="1" noRot="1" noChangeAspect="1"/>
+          </p:cNvSpPr>
+          <p:nvPr>
+            <p:ph type="sldImg"/>
+          </p:nvPr>
+        </p:nvSpPr>
+        <p:spPr/>
+      </p:sp>
+      <p:sp>
+        <p:nvSpPr>
+          <p:cNvPr id="3" name="Notes Placeholder 2"/>
+          <p:cNvSpPr>
+            <a:spLocks noGrp="1"/>
+          </p:cNvSpPr>
+          <p:nvPr>
+            <p:ph type="body" idx="1"/>
+          </p:nvPr>
+        </p:nvSpPr>
+        <p:spPr/>
+        <p:txBody>
+          <a:bodyPr/>
+          <a:lstStyle/>
+          <a:p>
+            <a:r>
+              <a:rPr lang="en-US" dirty="0"/>
+              <a:t>If opportunity doesn’t knock then build a door</a:t>
+            </a:r>
+            <a:endParaRPr lang="en-IN" dirty="0"/>
+          </a:p>
+        </p:txBody>
+      </p:sp>
+      <p:sp>
+        <p:nvSpPr>
+          <p:cNvPr id="4" name="Slide Number Placeholder 3"/>
+          <p:cNvSpPr>
+            <a:spLocks noGrp="1"/>
+          </p:cNvSpPr>
+          <p:nvPr>
+            <p:ph type="sldNum" sz="quarter" idx="5"/>
+          </p:nvPr>
+        </p:nvSpPr>
+        <p:spPr/>
+        <p:txBody>
+          <a:bodyPr/>
+          <a:lstStyle/>
+          <a:p>
+            <a:fld id="{C718523B-6A04-4729-969A-C5867F038FBD}" type="slidenum">
+              <a:rPr lang="en-IN" smtClean="0"/>
+              <a:t>2</a:t>
+            </a:fld>
+            <a:endParaRPr lang="en-IN"/>
+          </a:p>
+        </p:txBody>
+      </p:sp>
+    </p:spTree>
+    <p:extLst>
+      <p:ext uri="{BB962C8B-B14F-4D97-AF65-F5344CB8AC3E}">
+        <p14:creationId xmlns:p14="http://schemas.microsoft.com/office/powerpoint/2010/main" val="938230201"/>
+      </p:ext>
+    </p:extLst>
+  </p:cSld>
+  <p:clrMapOvr>
+    <a:masterClrMapping/>
+  </p:clrMapOvr>
+</p:notes>
 </file>
 
 <file path=ppt/slideLayouts/slideLayout1.xml><?xml version="1.0" encoding="utf-8"?>
@@ -8008,7 +8454,7 @@
           <a:p>
             <a:r>
               <a:rPr lang="en-US" sz="1400" dirty="0"/>
-              <a:t>By: Raghuraj Mui(005) &amp; Karan </a:t>
+              <a:t>By: Raghuraj Muni(005) &amp; Karan </a:t>
             </a:r>
             <a:r>
               <a:rPr lang="en-US" sz="1400" dirty="0" err="1"/>
@@ -8099,10 +8545,56 @@
         </p:nvSpPr>
         <p:spPr/>
         <p:txBody>
-          <a:bodyPr/>
+          <a:bodyPr>
+            <a:normAutofit fontScale="92500" lnSpcReduction="10000"/>
+          </a:bodyPr>
           <a:lstStyle/>
           <a:p>
-            <a:endParaRPr lang="en-IN"/>
+            <a:r>
+              <a:rPr lang="en-US" dirty="0"/>
+              <a:t>Startups need funds to start, setup and function</a:t>
+            </a:r>
+          </a:p>
+          <a:p>
+            <a:r>
+              <a:rPr lang="en-IN" dirty="0"/>
+              <a:t>Create a student backed start-up ecosystem</a:t>
+            </a:r>
+          </a:p>
+          <a:p>
+            <a:r>
+              <a:rPr lang="en-IN" dirty="0"/>
+              <a:t>Students fund student’s projects hence creating a sense of credibility, responsibility and satisfaction</a:t>
+            </a:r>
+          </a:p>
+          <a:p>
+            <a:r>
+              <a:rPr lang="en-IN" dirty="0"/>
+              <a:t>Technology is evolving, then why should funding be don’t in the same traditional and unreliable manner?</a:t>
+            </a:r>
+          </a:p>
+          <a:p>
+            <a:r>
+              <a:rPr lang="en-IN" dirty="0"/>
+              <a:t>Establish a transparent and a decentralized funding platform which leaves no room for suspicion or middlemen </a:t>
+            </a:r>
+            <a:r>
+              <a:rPr lang="en-IN" dirty="0" err="1"/>
+              <a:t>intrution</a:t>
+            </a:r>
+            <a:endParaRPr lang="en-IN" dirty="0"/>
+          </a:p>
+          <a:p>
+            <a:r>
+              <a:rPr lang="en-IN" dirty="0"/>
+              <a:t>Smart contracts will help solve the problem of scams, frauds and misuse of power or opportunity</a:t>
+            </a:r>
+          </a:p>
+          <a:p>
+            <a:endParaRPr lang="en-IN" dirty="0"/>
+          </a:p>
+          <a:p>
+            <a:endParaRPr lang="en-IN" dirty="0"/>
           </a:p>
         </p:txBody>
       </p:sp>
@@ -8186,12 +8678,51 @@
             <p:ph idx="1"/>
           </p:nvPr>
         </p:nvSpPr>
-        <p:spPr/>
-        <p:txBody>
-          <a:bodyPr/>
+        <p:spPr>
+          <a:xfrm>
+            <a:off x="680321" y="2336873"/>
+            <a:ext cx="9613861" cy="4225852"/>
+          </a:xfrm>
+        </p:spPr>
+        <p:txBody>
+          <a:bodyPr>
+            <a:normAutofit fontScale="92500" lnSpcReduction="20000"/>
+          </a:bodyPr>
           <a:lstStyle/>
           <a:p>
-            <a:endParaRPr lang="en-IN"/>
+            <a:pPr algn="just"/>
+            <a:r>
+              <a:rPr lang="en-US" dirty="0"/>
+              <a:t>The current system of crowdfunding is cumbersome for both the funders and fund raisers, loop holes are present providing opportunities for scam or fraud</a:t>
+            </a:r>
+          </a:p>
+          <a:p>
+            <a:pPr algn="just"/>
+            <a:r>
+              <a:rPr lang="en-US" dirty="0"/>
+              <a:t>Funders as well as fund raisers loose trust in platforms which causes both these parties to loose money, time and opportunities</a:t>
+            </a:r>
+          </a:p>
+          <a:p>
+            <a:pPr algn="just"/>
+            <a:r>
+              <a:rPr lang="en-US" dirty="0"/>
+              <a:t>Startups no longer be beholden to the rules, regulations, and whims of the most popular crowdfunding platforms on the internet, it eliminates the problem of fees</a:t>
+            </a:r>
+          </a:p>
+          <a:p>
+            <a:pPr algn="just"/>
+            <a:r>
+              <a:rPr lang="en-US" dirty="0"/>
+              <a:t>Blockchain-based crowd funders wouldn’t have to worry about the fraud that have plagued modern-day crowdfunding projects as contributors will immediately receive fractional enterprise or product ownership</a:t>
+            </a:r>
+          </a:p>
+          <a:p>
+            <a:pPr algn="just"/>
+            <a:r>
+              <a:rPr lang="en-US" dirty="0"/>
+              <a:t>Smart contracts would provide built-in milestones that would prevent funds from being released without provenance as to a project or campaign’s legitimacy</a:t>
+            </a:r>
           </a:p>
         </p:txBody>
       </p:sp>
@@ -8272,10 +8803,170 @@
         </p:nvSpPr>
         <p:spPr/>
         <p:txBody>
-          <a:bodyPr/>
+          <a:bodyPr>
+            <a:normAutofit fontScale="62500" lnSpcReduction="20000"/>
+          </a:bodyPr>
           <a:lstStyle/>
           <a:p>
-            <a:endParaRPr lang="en-IN"/>
+            <a:r>
+              <a:rPr lang="en-US" dirty="0">
+                <a:effectLst/>
+                <a:latin typeface="Arial" panose="020B0604020202020204" pitchFamily="34" charset="0"/>
+              </a:rPr>
+              <a:t>1</a:t>
+            </a:r>
+            <a:br>
+              <a:rPr lang="en-US" dirty="0"/>
+            </a:br>
+            <a:r>
+              <a:rPr lang="en-US" dirty="0"/>
+              <a:t>Role of blockchain technology in crowdfunding</a:t>
+            </a:r>
+            <a:br>
+              <a:rPr lang="en-US" dirty="0"/>
+            </a:br>
+            <a:r>
+              <a:rPr lang="en-US" dirty="0"/>
+              <a:t>(international banking and finance) in 4th international conference ON</a:t>
+            </a:r>
+          </a:p>
+          <a:p>
+            <a:r>
+              <a:rPr lang="en-US" dirty="0"/>
+              <a:t>Management, economics &amp; finance</a:t>
+            </a:r>
+          </a:p>
+          <a:p>
+            <a:r>
+              <a:rPr lang="en-US" dirty="0"/>
+              <a:t>10-12 </a:t>
+            </a:r>
+            <a:r>
+              <a:rPr lang="en-US" dirty="0" err="1"/>
+              <a:t>september</a:t>
+            </a:r>
+            <a:r>
+              <a:rPr lang="en-US" dirty="0"/>
+              <a:t>, 2021</a:t>
+            </a:r>
+          </a:p>
+          <a:p>
+            <a:r>
+              <a:rPr lang="en-US" dirty="0"/>
+              <a:t>1. “Some simple economics of crowdfunding.”1 in this paper, the author walks us through</a:t>
+            </a:r>
+            <a:br>
+              <a:rPr lang="en-US" dirty="0"/>
+            </a:br>
+            <a:r>
+              <a:rPr lang="en-US" dirty="0"/>
+              <a:t>the case study in USA. They provide a preliminary exploration of the underlying economics.</a:t>
+            </a:r>
+            <a:br>
+              <a:rPr lang="en-US" dirty="0"/>
+            </a:br>
+            <a:r>
+              <a:rPr lang="en-US" dirty="0"/>
+              <a:t>They attempted to highlight to which economic theories are applicable.</a:t>
+            </a:r>
+            <a:br>
+              <a:rPr lang="en-US" dirty="0"/>
+            </a:br>
+            <a:r>
+              <a:rPr lang="en-US" dirty="0"/>
+              <a:t>2. “Crowdfunding and venture capital: substitutes or complements?” 2 the authors in this</a:t>
+            </a:r>
+            <a:br>
+              <a:rPr lang="en-US" dirty="0"/>
+            </a:br>
+            <a:r>
+              <a:rPr lang="en-US" dirty="0"/>
+              <a:t>paper, basically attempt to study the dynamics of crowdfunding and if venture capitalists and</a:t>
+            </a:r>
+            <a:br>
+              <a:rPr lang="en-US" dirty="0"/>
+            </a:br>
+            <a:r>
+              <a:rPr lang="en-US" dirty="0"/>
+              <a:t>the investors of crowdfunding are complimentary in nature</a:t>
+            </a:r>
+          </a:p>
+          <a:p>
+            <a:r>
+              <a:rPr lang="en-US" dirty="0"/>
+              <a:t>3. “Lemmings in the crowd: success and failure of crowdfunding platforms”3. In this paper,</a:t>
+            </a:r>
+            <a:br>
+              <a:rPr lang="en-US" dirty="0"/>
+            </a:br>
+            <a:r>
+              <a:rPr lang="en-US" dirty="0"/>
+              <a:t>the author tries to </a:t>
+            </a:r>
+            <a:r>
+              <a:rPr lang="en-US" dirty="0" err="1"/>
+              <a:t>analyse</a:t>
+            </a:r>
+            <a:r>
+              <a:rPr lang="en-US" dirty="0"/>
+              <a:t> the determinants which make a business a success or a failure,</a:t>
+            </a:r>
+            <a:br>
+              <a:rPr lang="en-US" dirty="0"/>
+            </a:br>
+            <a:r>
+              <a:rPr lang="en-US" dirty="0"/>
+              <a:t>especially the crowdfunding platforms. They have </a:t>
+            </a:r>
+            <a:r>
+              <a:rPr lang="en-US" dirty="0" err="1"/>
+              <a:t>analysed</a:t>
+            </a:r>
+            <a:r>
+              <a:rPr lang="en-US" dirty="0"/>
+              <a:t> the case studies of </a:t>
+            </a:r>
+            <a:r>
+              <a:rPr lang="en-US" dirty="0" err="1"/>
+              <a:t>kickstarter</a:t>
+            </a:r>
+            <a:r>
+              <a:rPr lang="en-US" dirty="0"/>
+              <a:t> and</a:t>
+            </a:r>
+            <a:br>
+              <a:rPr lang="en-US" dirty="0"/>
+            </a:br>
+            <a:r>
+              <a:rPr lang="en-US" dirty="0" err="1"/>
+              <a:t>indiegogo</a:t>
+            </a:r>
+            <a:r>
+              <a:rPr lang="en-US" dirty="0"/>
+              <a:t> in particular.</a:t>
+            </a:r>
+            <a:br>
+              <a:rPr lang="en-US" dirty="0"/>
+            </a:br>
+            <a:r>
+              <a:rPr lang="en-US" dirty="0"/>
+              <a:t>4. “How blockchain is revolutionizing crowdfunding”4. In this paper, the author explains</a:t>
+            </a:r>
+            <a:br>
+              <a:rPr lang="en-US" dirty="0"/>
+            </a:br>
+            <a:r>
+              <a:rPr lang="en-US" dirty="0"/>
+              <a:t>the limitations of the crowdfunding platforms and the benefits of blockchain technology and</a:t>
+            </a:r>
+            <a:br>
+              <a:rPr lang="en-US" dirty="0"/>
+            </a:br>
+            <a:r>
+              <a:rPr lang="en-US" dirty="0"/>
+              <a:t>how it is the future of crowdfunding owing to the ease and transparency of this model.</a:t>
+            </a:r>
+            <a:endParaRPr lang="en-IN" dirty="0"/>
           </a:p>
         </p:txBody>
       </p:sp>
@@ -8611,7 +9302,7 @@
           <a:bodyPr/>
           <a:lstStyle/>
           <a:p>
-            <a:endParaRPr lang="en-IN"/>
+            <a:endParaRPr lang="en-IN" dirty="0"/>
           </a:p>
         </p:txBody>
       </p:sp>
@@ -9015,4 +9706,299 @@
     </a:ext>
   </a:extLst>
 </a:theme>
+</file>
+
+<file path=ppt/theme/theme2.xml><?xml version="1.0" encoding="utf-8"?>
+<a:theme xmlns:a="http://schemas.openxmlformats.org/drawingml/2006/main" name="Office Theme">
+  <a:themeElements>
+    <a:clrScheme name="Office">
+      <a:dk1>
+        <a:sysClr val="windowText" lastClr="000000"/>
+      </a:dk1>
+      <a:lt1>
+        <a:sysClr val="window" lastClr="FFFFFF"/>
+      </a:lt1>
+      <a:dk2>
+        <a:srgbClr val="44546A"/>
+      </a:dk2>
+      <a:lt2>
+        <a:srgbClr val="E7E6E6"/>
+      </a:lt2>
+      <a:accent1>
+        <a:srgbClr val="4472C4"/>
+      </a:accent1>
+      <a:accent2>
+        <a:srgbClr val="ED7D31"/>
+      </a:accent2>
+      <a:accent3>
+        <a:srgbClr val="A5A5A5"/>
+      </a:accent3>
+      <a:accent4>
+        <a:srgbClr val="FFC000"/>
+      </a:accent4>
+      <a:accent5>
+        <a:srgbClr val="5B9BD5"/>
+      </a:accent5>
+      <a:accent6>
+        <a:srgbClr val="70AD47"/>
+      </a:accent6>
+      <a:hlink>
+        <a:srgbClr val="0563C1"/>
+      </a:hlink>
+      <a:folHlink>
+        <a:srgbClr val="954F72"/>
+      </a:folHlink>
+    </a:clrScheme>
+    <a:fontScheme name="Office">
+      <a:majorFont>
+        <a:latin typeface="Calibri Light" panose="020F0302020204030204"/>
+        <a:ea typeface=""/>
+        <a:cs typeface=""/>
+        <a:font script="Jpan" typeface="游ゴシック Light"/>
+        <a:font script="Hang" typeface="맑은 고딕"/>
+        <a:font script="Hans" typeface="等线 Light"/>
+        <a:font script="Hant" typeface="新細明體"/>
+        <a:font script="Arab" typeface="Times New Roman"/>
+        <a:font script="Hebr" typeface="Times New Roman"/>
+        <a:font script="Thai" typeface="Angsana New"/>
+        <a:font script="Ethi" typeface="Nyala"/>
+        <a:font script="Beng" typeface="Vrinda"/>
+        <a:font script="Gujr" typeface="Shruti"/>
+        <a:font script="Khmr" typeface="MoolBoran"/>
+        <a:font script="Knda" typeface="Tunga"/>
+        <a:font script="Guru" typeface="Raavi"/>
+        <a:font script="Cans" typeface="Euphemia"/>
+        <a:font script="Cher" typeface="Plantagenet Cherokee"/>
+        <a:font script="Yiii" typeface="Microsoft Yi Baiti"/>
+        <a:font script="Tibt" typeface="Microsoft Himalaya"/>
+        <a:font script="Thaa" typeface="MV Boli"/>
+        <a:font script="Deva" typeface="Mangal"/>
+        <a:font script="Telu" typeface="Gautami"/>
+        <a:font script="Taml" typeface="Latha"/>
+        <a:font script="Syrc" typeface="Estrangelo Edessa"/>
+        <a:font script="Orya" typeface="Kalinga"/>
+        <a:font script="Mlym" typeface="Kartika"/>
+        <a:font script="Laoo" typeface="DokChampa"/>
+        <a:font script="Sinh" typeface="Iskoola Pota"/>
+        <a:font script="Mong" typeface="Mongolian Baiti"/>
+        <a:font script="Viet" typeface="Times New Roman"/>
+        <a:font script="Uigh" typeface="Microsoft Uighur"/>
+        <a:font script="Geor" typeface="Sylfaen"/>
+        <a:font script="Armn" typeface="Arial"/>
+        <a:font script="Bugi" typeface="Leelawadee UI"/>
+        <a:font script="Bopo" typeface="Microsoft JhengHei"/>
+        <a:font script="Java" typeface="Javanese Text"/>
+        <a:font script="Lisu" typeface="Segoe UI"/>
+        <a:font script="Mymr" typeface="Myanmar Text"/>
+        <a:font script="Nkoo" typeface="Ebrima"/>
+        <a:font script="Olck" typeface="Nirmala UI"/>
+        <a:font script="Osma" typeface="Ebrima"/>
+        <a:font script="Phag" typeface="Phagspa"/>
+        <a:font script="Syrn" typeface="Estrangelo Edessa"/>
+        <a:font script="Syrj" typeface="Estrangelo Edessa"/>
+        <a:font script="Syre" typeface="Estrangelo Edessa"/>
+        <a:font script="Sora" typeface="Nirmala UI"/>
+        <a:font script="Tale" typeface="Microsoft Tai Le"/>
+        <a:font script="Talu" typeface="Microsoft New Tai Lue"/>
+        <a:font script="Tfng" typeface="Ebrima"/>
+      </a:majorFont>
+      <a:minorFont>
+        <a:latin typeface="Calibri" panose="020F0502020204030204"/>
+        <a:ea typeface=""/>
+        <a:cs typeface=""/>
+        <a:font script="Jpan" typeface="游ゴシック"/>
+        <a:font script="Hang" typeface="맑은 고딕"/>
+        <a:font script="Hans" typeface="等线"/>
+        <a:font script="Hant" typeface="新細明體"/>
+        <a:font script="Arab" typeface="Arial"/>
+        <a:font script="Hebr" typeface="Arial"/>
+        <a:font script="Thai" typeface="Cordia New"/>
+        <a:font script="Ethi" typeface="Nyala"/>
+        <a:font script="Beng" typeface="Vrinda"/>
+        <a:font script="Gujr" typeface="Shruti"/>
+        <a:font script="Khmr" typeface="DaunPenh"/>
+        <a:font script="Knda" typeface="Tunga"/>
+        <a:font script="Guru" typeface="Raavi"/>
+        <a:font script="Cans" typeface="Euphemia"/>
+        <a:font script="Cher" typeface="Plantagenet Cherokee"/>
+        <a:font script="Yiii" typeface="Microsoft Yi Baiti"/>
+        <a:font script="Tibt" typeface="Microsoft Himalaya"/>
+        <a:font script="Thaa" typeface="MV Boli"/>
+        <a:font script="Deva" typeface="Mangal"/>
+        <a:font script="Telu" typeface="Gautami"/>
+        <a:font script="Taml" typeface="Latha"/>
+        <a:font script="Syrc" typeface="Estrangelo Edessa"/>
+        <a:font script="Orya" typeface="Kalinga"/>
+        <a:font script="Mlym" typeface="Kartika"/>
+        <a:font script="Laoo" typeface="DokChampa"/>
+        <a:font script="Sinh" typeface="Iskoola Pota"/>
+        <a:font script="Mong" typeface="Mongolian Baiti"/>
+        <a:font script="Viet" typeface="Arial"/>
+        <a:font script="Uigh" typeface="Microsoft Uighur"/>
+        <a:font script="Geor" typeface="Sylfaen"/>
+        <a:font script="Armn" typeface="Arial"/>
+        <a:font script="Bugi" typeface="Leelawadee UI"/>
+        <a:font script="Bopo" typeface="Microsoft JhengHei"/>
+        <a:font script="Java" typeface="Javanese Text"/>
+        <a:font script="Lisu" typeface="Segoe UI"/>
+        <a:font script="Mymr" typeface="Myanmar Text"/>
+        <a:font script="Nkoo" typeface="Ebrima"/>
+        <a:font script="Olck" typeface="Nirmala UI"/>
+        <a:font script="Osma" typeface="Ebrima"/>
+        <a:font script="Phag" typeface="Phagspa"/>
+        <a:font script="Syrn" typeface="Estrangelo Edessa"/>
+        <a:font script="Syrj" typeface="Estrangelo Edessa"/>
+        <a:font script="Syre" typeface="Estrangelo Edessa"/>
+        <a:font script="Sora" typeface="Nirmala UI"/>
+        <a:font script="Tale" typeface="Microsoft Tai Le"/>
+        <a:font script="Talu" typeface="Microsoft New Tai Lue"/>
+        <a:font script="Tfng" typeface="Ebrima"/>
+      </a:minorFont>
+    </a:fontScheme>
+    <a:fmtScheme name="Office">
+      <a:fillStyleLst>
+        <a:solidFill>
+          <a:schemeClr val="phClr"/>
+        </a:solidFill>
+        <a:gradFill rotWithShape="1">
+          <a:gsLst>
+            <a:gs pos="0">
+              <a:schemeClr val="phClr">
+                <a:lumMod val="110000"/>
+                <a:satMod val="105000"/>
+                <a:tint val="67000"/>
+              </a:schemeClr>
+            </a:gs>
+            <a:gs pos="50000">
+              <a:schemeClr val="phClr">
+                <a:lumMod val="105000"/>
+                <a:satMod val="103000"/>
+                <a:tint val="73000"/>
+              </a:schemeClr>
+            </a:gs>
+            <a:gs pos="100000">
+              <a:schemeClr val="phClr">
+                <a:lumMod val="105000"/>
+                <a:satMod val="109000"/>
+                <a:tint val="81000"/>
+              </a:schemeClr>
+            </a:gs>
+          </a:gsLst>
+          <a:lin ang="5400000" scaled="0"/>
+        </a:gradFill>
+        <a:gradFill rotWithShape="1">
+          <a:gsLst>
+            <a:gs pos="0">
+              <a:schemeClr val="phClr">
+                <a:satMod val="103000"/>
+                <a:lumMod val="102000"/>
+                <a:tint val="94000"/>
+              </a:schemeClr>
+            </a:gs>
+            <a:gs pos="50000">
+              <a:schemeClr val="phClr">
+                <a:satMod val="110000"/>
+                <a:lumMod val="100000"/>
+                <a:shade val="100000"/>
+              </a:schemeClr>
+            </a:gs>
+            <a:gs pos="100000">
+              <a:schemeClr val="phClr">
+                <a:lumMod val="99000"/>
+                <a:satMod val="120000"/>
+                <a:shade val="78000"/>
+              </a:schemeClr>
+            </a:gs>
+          </a:gsLst>
+          <a:lin ang="5400000" scaled="0"/>
+        </a:gradFill>
+      </a:fillStyleLst>
+      <a:lnStyleLst>
+        <a:ln w="6350" cap="flat" cmpd="sng" algn="ctr">
+          <a:solidFill>
+            <a:schemeClr val="phClr"/>
+          </a:solidFill>
+          <a:prstDash val="solid"/>
+          <a:miter lim="800000"/>
+        </a:ln>
+        <a:ln w="12700" cap="flat" cmpd="sng" algn="ctr">
+          <a:solidFill>
+            <a:schemeClr val="phClr"/>
+          </a:solidFill>
+          <a:prstDash val="solid"/>
+          <a:miter lim="800000"/>
+        </a:ln>
+        <a:ln w="19050" cap="flat" cmpd="sng" algn="ctr">
+          <a:solidFill>
+            <a:schemeClr val="phClr"/>
+          </a:solidFill>
+          <a:prstDash val="solid"/>
+          <a:miter lim="800000"/>
+        </a:ln>
+      </a:lnStyleLst>
+      <a:effectStyleLst>
+        <a:effectStyle>
+          <a:effectLst/>
+        </a:effectStyle>
+        <a:effectStyle>
+          <a:effectLst/>
+        </a:effectStyle>
+        <a:effectStyle>
+          <a:effectLst>
+            <a:outerShdw blurRad="57150" dist="19050" dir="5400000" algn="ctr" rotWithShape="0">
+              <a:srgbClr val="000000">
+                <a:alpha val="63000"/>
+              </a:srgbClr>
+            </a:outerShdw>
+          </a:effectLst>
+        </a:effectStyle>
+      </a:effectStyleLst>
+      <a:bgFillStyleLst>
+        <a:solidFill>
+          <a:schemeClr val="phClr"/>
+        </a:solidFill>
+        <a:solidFill>
+          <a:schemeClr val="phClr">
+            <a:tint val="95000"/>
+            <a:satMod val="170000"/>
+          </a:schemeClr>
+        </a:solidFill>
+        <a:gradFill rotWithShape="1">
+          <a:gsLst>
+            <a:gs pos="0">
+              <a:schemeClr val="phClr">
+                <a:tint val="93000"/>
+                <a:satMod val="150000"/>
+                <a:shade val="98000"/>
+                <a:lumMod val="102000"/>
+              </a:schemeClr>
+            </a:gs>
+            <a:gs pos="50000">
+              <a:schemeClr val="phClr">
+                <a:tint val="98000"/>
+                <a:satMod val="130000"/>
+                <a:shade val="90000"/>
+                <a:lumMod val="103000"/>
+              </a:schemeClr>
+            </a:gs>
+            <a:gs pos="100000">
+              <a:schemeClr val="phClr">
+                <a:shade val="63000"/>
+                <a:satMod val="120000"/>
+              </a:schemeClr>
+            </a:gs>
+          </a:gsLst>
+          <a:lin ang="5400000" scaled="0"/>
+        </a:gradFill>
+      </a:bgFillStyleLst>
+    </a:fmtScheme>
+  </a:themeElements>
+  <a:objectDefaults/>
+  <a:extraClrSchemeLst/>
+  <a:extLst>
+    <a:ext uri="{05A4C25C-085E-4340-85A3-A5531E510DB2}">
+      <thm15:themeFamily xmlns:thm15="http://schemas.microsoft.com/office/thememl/2012/main" name="Office Theme" id="{62F939B6-93AF-4DB8-9C6B-D6C7DFDC589F}" vid="{4A3C46E8-61CC-4603-A589-7422A47A8E4A}"/>
+    </a:ext>
+  </a:extLst>
+</a:theme>
 </file>
</xml_diff>

<commit_message>
inncovation, scope, final touches
</commit_message>
<xml_diff>
--- a/Major_Project_Review_1.pptx
+++ b/Major_Project_Review_1.pptx
@@ -5,18 +5,18 @@
     <p:sldMasterId id="2147483648" r:id="rId1"/>
   </p:sldMasterIdLst>
   <p:notesMasterIdLst>
-    <p:notesMasterId r:id="rId5"/>
+    <p:notesMasterId r:id="rId11"/>
   </p:notesMasterIdLst>
   <p:sldIdLst>
-    <p:sldId id="256" r:id="rId3"/>
-    <p:sldId id="257" r:id="rId4"/>
-    <p:sldId id="258" r:id="rId6"/>
-    <p:sldId id="259" r:id="rId7"/>
-    <p:sldId id="260" r:id="rId8"/>
-    <p:sldId id="261" r:id="rId9"/>
-    <p:sldId id="262" r:id="rId10"/>
-    <p:sldId id="263" r:id="rId11"/>
-    <p:sldId id="264" r:id="rId12"/>
+    <p:sldId id="256" r:id="rId2"/>
+    <p:sldId id="257" r:id="rId3"/>
+    <p:sldId id="258" r:id="rId4"/>
+    <p:sldId id="259" r:id="rId5"/>
+    <p:sldId id="260" r:id="rId6"/>
+    <p:sldId id="261" r:id="rId7"/>
+    <p:sldId id="262" r:id="rId8"/>
+    <p:sldId id="263" r:id="rId9"/>
+    <p:sldId id="264" r:id="rId10"/>
   </p:sldIdLst>
   <p:sldSz cx="12192000" cy="6858000"/>
   <p:notesSz cx="6858000" cy="9144000"/>
@@ -115,6 +115,11 @@
       </a:defRPr>
     </a:lvl9pPr>
   </p:defaultTextStyle>
+  <p:extLst>
+    <p:ext uri="{EFAFB233-063F-42B5-8137-9DF3F51BA10A}">
+      <p15:sldGuideLst xmlns:p15="http://schemas.microsoft.com/office/powerpoint/2012/main"/>
+    </p:ext>
+  </p:extLst>
 </p:presentation>
 </file>
 
@@ -200,6 +205,7 @@
           <a:p>
             <a:fld id="{D5BBF475-32C9-4801-B200-59803DE05097}" type="datetimeFigureOut">
               <a:rPr lang="en-IN" smtClean="0"/>
+              <a:t>12-01-2022</a:t>
             </a:fld>
             <a:endParaRPr lang="en-IN"/>
           </a:p>
@@ -266,7 +272,6 @@
               <a:rPr lang="en-US"/>
               <a:t>Click to edit Master text styles</a:t>
             </a:r>
-            <a:endParaRPr lang="en-US"/>
           </a:p>
           <a:p>
             <a:pPr lvl="1"/>
@@ -274,7 +279,6 @@
               <a:rPr lang="en-US"/>
               <a:t>Second level</a:t>
             </a:r>
-            <a:endParaRPr lang="en-US"/>
           </a:p>
           <a:p>
             <a:pPr lvl="2"/>
@@ -282,7 +286,6 @@
               <a:rPr lang="en-US"/>
               <a:t>Third level</a:t>
             </a:r>
-            <a:endParaRPr lang="en-US"/>
           </a:p>
           <a:p>
             <a:pPr lvl="3"/>
@@ -290,7 +293,6 @@
               <a:rPr lang="en-US"/>
               <a:t>Fourth level</a:t>
             </a:r>
-            <a:endParaRPr lang="en-US"/>
           </a:p>
           <a:p>
             <a:pPr lvl="4"/>
@@ -362,6 +364,7 @@
           <a:p>
             <a:fld id="{C718523B-6A04-4729-969A-C5867F038FBD}" type="slidenum">
               <a:rPr lang="en-IN" smtClean="0"/>
+              <a:t>‹#›</a:t>
             </a:fld>
             <a:endParaRPr lang="en-IN"/>
           </a:p>
@@ -534,6 +537,7 @@
           <a:p>
             <a:fld id="{C718523B-6A04-4729-969A-C5867F038FBD}" type="slidenum">
               <a:rPr lang="en-IN" smtClean="0"/>
+              <a:t>2</a:t>
             </a:fld>
             <a:endParaRPr lang="en-IN"/>
           </a:p>
@@ -821,6 +825,7 @@
           <a:p>
             <a:fld id="{EEB5FC34-ED1B-4AC7-8A42-C8C65DEFFD02}" type="datetimeFigureOut">
               <a:rPr lang="en-IN" smtClean="0"/>
+              <a:t>12-01-2022</a:t>
             </a:fld>
             <a:endParaRPr lang="en-IN"/>
           </a:p>
@@ -867,6 +872,7 @@
           <a:p>
             <a:fld id="{66FE3F88-9A3D-48A2-863C-60B6630B7F25}" type="slidenum">
               <a:rPr lang="en-IN" smtClean="0"/>
+              <a:t>‹#›</a:t>
             </a:fld>
             <a:endParaRPr lang="en-IN"/>
           </a:p>
@@ -936,7 +942,7 @@
           <p:nvPr/>
         </p:nvPicPr>
         <p:blipFill>
-          <a:blip r:embed="rId3">
+          <a:blip r:embed="rId3" cstate="print">
             <a:extLst>
               <a:ext uri="{28A0092B-C50C-407E-A947-70E740481C1C}">
                 <a14:useLocalDpi xmlns:a14="http://schemas.microsoft.com/office/drawing/2010/main" val="0"/>
@@ -1208,7 +1214,6 @@
               <a:rPr lang="en-US"/>
               <a:t>Click to edit Master text styles</a:t>
             </a:r>
-            <a:endParaRPr lang="en-US"/>
           </a:p>
         </p:txBody>
       </p:sp>
@@ -1229,6 +1234,7 @@
           <a:p>
             <a:fld id="{EEB5FC34-ED1B-4AC7-8A42-C8C65DEFFD02}" type="datetimeFigureOut">
               <a:rPr lang="en-IN" smtClean="0"/>
+              <a:t>12-01-2022</a:t>
             </a:fld>
             <a:endParaRPr lang="en-IN"/>
           </a:p>
@@ -1275,6 +1281,7 @@
           <a:p>
             <a:fld id="{66FE3F88-9A3D-48A2-863C-60B6630B7F25}" type="slidenum">
               <a:rPr lang="en-IN" smtClean="0"/>
+              <a:t>‹#›</a:t>
             </a:fld>
             <a:endParaRPr lang="en-IN"/>
           </a:p>
@@ -1344,7 +1351,7 @@
           <p:nvPr/>
         </p:nvPicPr>
         <p:blipFill>
-          <a:blip r:embed="rId3">
+          <a:blip r:embed="rId3" cstate="print">
             <a:extLst>
               <a:ext uri="{28A0092B-C50C-407E-A947-70E740481C1C}">
                 <a14:useLocalDpi xmlns:a14="http://schemas.microsoft.com/office/drawing/2010/main" val="0"/>
@@ -1538,7 +1545,6 @@
               <a:rPr lang="en-US"/>
               <a:t>Click to edit Master text styles</a:t>
             </a:r>
-            <a:endParaRPr lang="en-US"/>
           </a:p>
         </p:txBody>
       </p:sp>
@@ -1559,6 +1565,7 @@
           <a:p>
             <a:fld id="{EEB5FC34-ED1B-4AC7-8A42-C8C65DEFFD02}" type="datetimeFigureOut">
               <a:rPr lang="en-IN" smtClean="0"/>
+              <a:t>12-01-2022</a:t>
             </a:fld>
             <a:endParaRPr lang="en-IN"/>
           </a:p>
@@ -1605,6 +1612,7 @@
           <a:p>
             <a:fld id="{66FE3F88-9A3D-48A2-863C-60B6630B7F25}" type="slidenum">
               <a:rPr lang="en-IN" smtClean="0"/>
+              <a:t>‹#›</a:t>
             </a:fld>
             <a:endParaRPr lang="en-IN"/>
           </a:p>
@@ -1674,7 +1682,7 @@
           <p:nvPr/>
         </p:nvPicPr>
         <p:blipFill>
-          <a:blip r:embed="rId3">
+          <a:blip r:embed="rId3" cstate="print">
             <a:extLst>
               <a:ext uri="{28A0092B-C50C-407E-A947-70E740481C1C}">
                 <a14:useLocalDpi xmlns:a14="http://schemas.microsoft.com/office/drawing/2010/main" val="0"/>
@@ -1870,7 +1878,6 @@
               <a:rPr lang="en-US"/>
               <a:t>Click to edit Master text styles</a:t>
             </a:r>
-            <a:endParaRPr lang="en-US"/>
           </a:p>
         </p:txBody>
       </p:sp>
@@ -1938,7 +1945,6 @@
               <a:rPr lang="en-US"/>
               <a:t>Click to edit Master text styles</a:t>
             </a:r>
-            <a:endParaRPr lang="en-US"/>
           </a:p>
         </p:txBody>
       </p:sp>
@@ -1959,6 +1965,7 @@
           <a:p>
             <a:fld id="{EEB5FC34-ED1B-4AC7-8A42-C8C65DEFFD02}" type="datetimeFigureOut">
               <a:rPr lang="en-IN" smtClean="0"/>
+              <a:t>12-01-2022</a:t>
             </a:fld>
             <a:endParaRPr lang="en-IN"/>
           </a:p>
@@ -2005,6 +2012,7 @@
           <a:p>
             <a:fld id="{66FE3F88-9A3D-48A2-863C-60B6630B7F25}" type="slidenum">
               <a:rPr lang="en-IN" smtClean="0"/>
+              <a:t>‹#›</a:t>
             </a:fld>
             <a:endParaRPr lang="en-IN"/>
           </a:p>
@@ -2123,12 +2131,6 @@
               </a:rPr>
               <a:t>“</a:t>
             </a:r>
-            <a:endParaRPr lang="en-US" sz="7200" dirty="0">
-              <a:solidFill>
-                <a:schemeClr val="tx1"/>
-              </a:solidFill>
-              <a:effectLst/>
-            </a:endParaRPr>
           </a:p>
         </p:txBody>
       </p:sp>
@@ -2245,12 +2247,6 @@
               </a:rPr>
               <a:t>”</a:t>
             </a:r>
-            <a:endParaRPr lang="en-US" sz="7200" dirty="0">
-              <a:solidFill>
-                <a:schemeClr val="tx1"/>
-              </a:solidFill>
-              <a:effectLst/>
-            </a:endParaRPr>
           </a:p>
         </p:txBody>
       </p:sp>
@@ -2318,7 +2314,7 @@
           <p:nvPr/>
         </p:nvPicPr>
         <p:blipFill>
-          <a:blip r:embed="rId3">
+          <a:blip r:embed="rId3" cstate="print">
             <a:extLst>
               <a:ext uri="{28A0092B-C50C-407E-A947-70E740481C1C}">
                 <a14:useLocalDpi xmlns:a14="http://schemas.microsoft.com/office/drawing/2010/main" val="0"/>
@@ -2512,7 +2508,6 @@
               <a:rPr lang="en-US"/>
               <a:t>Click to edit Master text styles</a:t>
             </a:r>
-            <a:endParaRPr lang="en-US"/>
           </a:p>
         </p:txBody>
       </p:sp>
@@ -2533,6 +2528,7 @@
           <a:p>
             <a:fld id="{EEB5FC34-ED1B-4AC7-8A42-C8C65DEFFD02}" type="datetimeFigureOut">
               <a:rPr lang="en-IN" smtClean="0"/>
+              <a:t>12-01-2022</a:t>
             </a:fld>
             <a:endParaRPr lang="en-IN"/>
           </a:p>
@@ -2579,6 +2575,7 @@
           <a:p>
             <a:fld id="{66FE3F88-9A3D-48A2-863C-60B6630B7F25}" type="slidenum">
               <a:rPr lang="en-IN" smtClean="0"/>
+              <a:t>‹#›</a:t>
             </a:fld>
             <a:endParaRPr lang="en-IN"/>
           </a:p>
@@ -2648,7 +2645,7 @@
           <p:nvPr/>
         </p:nvPicPr>
         <p:blipFill>
-          <a:blip r:embed="rId3">
+          <a:blip r:embed="rId3" cstate="print">
             <a:extLst>
               <a:ext uri="{28A0092B-C50C-407E-A947-70E740481C1C}">
                 <a14:useLocalDpi xmlns:a14="http://schemas.microsoft.com/office/drawing/2010/main" val="0"/>
@@ -2844,7 +2841,6 @@
               <a:rPr lang="en-US"/>
               <a:t>Click to edit Master text styles</a:t>
             </a:r>
-            <a:endParaRPr lang="en-US"/>
           </a:p>
         </p:txBody>
       </p:sp>
@@ -2912,7 +2908,6 @@
               <a:rPr lang="en-US"/>
               <a:t>Click to edit Master text styles</a:t>
             </a:r>
-            <a:endParaRPr lang="en-US"/>
           </a:p>
         </p:txBody>
       </p:sp>
@@ -2984,7 +2979,6 @@
               <a:rPr lang="en-US"/>
               <a:t>Click to edit Master text styles</a:t>
             </a:r>
-            <a:endParaRPr lang="en-US"/>
           </a:p>
         </p:txBody>
       </p:sp>
@@ -3052,7 +3046,6 @@
               <a:rPr lang="en-US"/>
               <a:t>Click to edit Master text styles</a:t>
             </a:r>
-            <a:endParaRPr lang="en-US"/>
           </a:p>
         </p:txBody>
       </p:sp>
@@ -3124,7 +3117,6 @@
               <a:rPr lang="en-US"/>
               <a:t>Click to edit Master text styles</a:t>
             </a:r>
-            <a:endParaRPr lang="en-US"/>
           </a:p>
         </p:txBody>
       </p:sp>
@@ -3192,7 +3184,6 @@
               <a:rPr lang="en-US"/>
               <a:t>Click to edit Master text styles</a:t>
             </a:r>
-            <a:endParaRPr lang="en-US"/>
           </a:p>
         </p:txBody>
       </p:sp>
@@ -3213,6 +3204,7 @@
           <a:p>
             <a:fld id="{EEB5FC34-ED1B-4AC7-8A42-C8C65DEFFD02}" type="datetimeFigureOut">
               <a:rPr lang="en-IN" smtClean="0"/>
+              <a:t>12-01-2022</a:t>
             </a:fld>
             <a:endParaRPr lang="en-IN"/>
           </a:p>
@@ -3254,6 +3246,7 @@
           <a:p>
             <a:fld id="{66FE3F88-9A3D-48A2-863C-60B6630B7F25}" type="slidenum">
               <a:rPr lang="en-IN" smtClean="0"/>
+              <a:t>‹#›</a:t>
             </a:fld>
             <a:endParaRPr lang="en-IN"/>
           </a:p>
@@ -3323,7 +3316,7 @@
           <p:nvPr/>
         </p:nvPicPr>
         <p:blipFill>
-          <a:blip r:embed="rId3">
+          <a:blip r:embed="rId3" cstate="print">
             <a:extLst>
               <a:ext uri="{28A0092B-C50C-407E-A947-70E740481C1C}">
                 <a14:useLocalDpi xmlns:a14="http://schemas.microsoft.com/office/drawing/2010/main" val="0"/>
@@ -3519,7 +3512,6 @@
               <a:rPr lang="en-US"/>
               <a:t>Click to edit Master text styles</a:t>
             </a:r>
-            <a:endParaRPr lang="en-US"/>
           </a:p>
         </p:txBody>
       </p:sp>
@@ -3666,7 +3658,6 @@
               <a:rPr lang="en-US"/>
               <a:t>Click to edit Master text styles</a:t>
             </a:r>
-            <a:endParaRPr lang="en-US"/>
           </a:p>
         </p:txBody>
       </p:sp>
@@ -3738,7 +3729,6 @@
               <a:rPr lang="en-US"/>
               <a:t>Click to edit Master text styles</a:t>
             </a:r>
-            <a:endParaRPr lang="en-US"/>
           </a:p>
         </p:txBody>
       </p:sp>
@@ -3885,7 +3875,6 @@
               <a:rPr lang="en-US"/>
               <a:t>Click to edit Master text styles</a:t>
             </a:r>
-            <a:endParaRPr lang="en-US"/>
           </a:p>
         </p:txBody>
       </p:sp>
@@ -3957,7 +3946,6 @@
               <a:rPr lang="en-US"/>
               <a:t>Click to edit Master text styles</a:t>
             </a:r>
-            <a:endParaRPr lang="en-US"/>
           </a:p>
         </p:txBody>
       </p:sp>
@@ -4104,7 +4092,6 @@
               <a:rPr lang="en-US"/>
               <a:t>Click to edit Master text styles</a:t>
             </a:r>
-            <a:endParaRPr lang="en-US"/>
           </a:p>
         </p:txBody>
       </p:sp>
@@ -4125,6 +4112,7 @@
           <a:p>
             <a:fld id="{EEB5FC34-ED1B-4AC7-8A42-C8C65DEFFD02}" type="datetimeFigureOut">
               <a:rPr lang="en-IN" smtClean="0"/>
+              <a:t>12-01-2022</a:t>
             </a:fld>
             <a:endParaRPr lang="en-IN"/>
           </a:p>
@@ -4166,6 +4154,7 @@
           <a:p>
             <a:fld id="{66FE3F88-9A3D-48A2-863C-60B6630B7F25}" type="slidenum">
               <a:rPr lang="en-IN" smtClean="0"/>
+              <a:t>‹#›</a:t>
             </a:fld>
             <a:endParaRPr lang="en-IN"/>
           </a:p>
@@ -4235,7 +4224,7 @@
           <p:nvPr/>
         </p:nvPicPr>
         <p:blipFill>
-          <a:blip r:embed="rId3">
+          <a:blip r:embed="rId3" cstate="print">
             <a:extLst>
               <a:ext uri="{28A0092B-C50C-407E-A947-70E740481C1C}">
                 <a14:useLocalDpi xmlns:a14="http://schemas.microsoft.com/office/drawing/2010/main" val="0"/>
@@ -4382,7 +4371,6 @@
               <a:rPr lang="en-US"/>
               <a:t>Click to edit Master text styles</a:t>
             </a:r>
-            <a:endParaRPr lang="en-US"/>
           </a:p>
           <a:p>
             <a:pPr lvl="1"/>
@@ -4390,7 +4378,6 @@
               <a:rPr lang="en-US"/>
               <a:t>Second level</a:t>
             </a:r>
-            <a:endParaRPr lang="en-US"/>
           </a:p>
           <a:p>
             <a:pPr lvl="2"/>
@@ -4398,7 +4385,6 @@
               <a:rPr lang="en-US"/>
               <a:t>Third level</a:t>
             </a:r>
-            <a:endParaRPr lang="en-US"/>
           </a:p>
           <a:p>
             <a:pPr lvl="3"/>
@@ -4406,7 +4392,6 @@
               <a:rPr lang="en-US"/>
               <a:t>Fourth level</a:t>
             </a:r>
-            <a:endParaRPr lang="en-US"/>
           </a:p>
           <a:p>
             <a:pPr lvl="4"/>
@@ -4435,6 +4420,7 @@
           <a:p>
             <a:fld id="{EEB5FC34-ED1B-4AC7-8A42-C8C65DEFFD02}" type="datetimeFigureOut">
               <a:rPr lang="en-IN" smtClean="0"/>
+              <a:t>12-01-2022</a:t>
             </a:fld>
             <a:endParaRPr lang="en-IN"/>
           </a:p>
@@ -4476,6 +4462,7 @@
           <a:p>
             <a:fld id="{66FE3F88-9A3D-48A2-863C-60B6630B7F25}" type="slidenum">
               <a:rPr lang="en-IN" smtClean="0"/>
+              <a:t>‹#›</a:t>
             </a:fld>
             <a:endParaRPr lang="en-IN"/>
           </a:p>
@@ -4638,7 +4625,6 @@
               <a:rPr lang="en-US"/>
               <a:t>Click to edit Master text styles</a:t>
             </a:r>
-            <a:endParaRPr lang="en-US"/>
           </a:p>
           <a:p>
             <a:pPr lvl="1"/>
@@ -4646,7 +4632,6 @@
               <a:rPr lang="en-US"/>
               <a:t>Second level</a:t>
             </a:r>
-            <a:endParaRPr lang="en-US"/>
           </a:p>
           <a:p>
             <a:pPr lvl="2"/>
@@ -4654,7 +4639,6 @@
               <a:rPr lang="en-US"/>
               <a:t>Third level</a:t>
             </a:r>
-            <a:endParaRPr lang="en-US"/>
           </a:p>
           <a:p>
             <a:pPr lvl="3"/>
@@ -4662,7 +4646,6 @@
               <a:rPr lang="en-US"/>
               <a:t>Fourth level</a:t>
             </a:r>
-            <a:endParaRPr lang="en-US"/>
           </a:p>
           <a:p>
             <a:pPr lvl="4"/>
@@ -4696,6 +4679,7 @@
           <a:p>
             <a:fld id="{EEB5FC34-ED1B-4AC7-8A42-C8C65DEFFD02}" type="datetimeFigureOut">
               <a:rPr lang="en-IN" smtClean="0"/>
+              <a:t>12-01-2022</a:t>
             </a:fld>
             <a:endParaRPr lang="en-IN"/>
           </a:p>
@@ -4751,6 +4735,7 @@
           <a:p>
             <a:fld id="{66FE3F88-9A3D-48A2-863C-60B6630B7F25}" type="slidenum">
               <a:rPr lang="en-IN" smtClean="0"/>
+              <a:t>‹#›</a:t>
             </a:fld>
             <a:endParaRPr lang="en-IN"/>
           </a:p>
@@ -4820,7 +4805,7 @@
           <p:nvPr/>
         </p:nvPicPr>
         <p:blipFill>
-          <a:blip r:embed="rId3">
+          <a:blip r:embed="rId3" cstate="print">
             <a:extLst>
               <a:ext uri="{28A0092B-C50C-407E-A947-70E740481C1C}">
                 <a14:useLocalDpi xmlns:a14="http://schemas.microsoft.com/office/drawing/2010/main" val="0"/>
@@ -4963,7 +4948,6 @@
               <a:rPr lang="en-US"/>
               <a:t>Click to edit Master text styles</a:t>
             </a:r>
-            <a:endParaRPr lang="en-US"/>
           </a:p>
           <a:p>
             <a:pPr lvl="1"/>
@@ -4971,7 +4955,6 @@
               <a:rPr lang="en-US"/>
               <a:t>Second level</a:t>
             </a:r>
-            <a:endParaRPr lang="en-US"/>
           </a:p>
           <a:p>
             <a:pPr lvl="2"/>
@@ -4979,7 +4962,6 @@
               <a:rPr lang="en-US"/>
               <a:t>Third level</a:t>
             </a:r>
-            <a:endParaRPr lang="en-US"/>
           </a:p>
           <a:p>
             <a:pPr lvl="3"/>
@@ -4987,7 +4969,6 @@
               <a:rPr lang="en-US"/>
               <a:t>Fourth level</a:t>
             </a:r>
-            <a:endParaRPr lang="en-US"/>
           </a:p>
           <a:p>
             <a:pPr lvl="4"/>
@@ -5016,6 +4997,7 @@
           <a:p>
             <a:fld id="{EEB5FC34-ED1B-4AC7-8A42-C8C65DEFFD02}" type="datetimeFigureOut">
               <a:rPr lang="en-IN" smtClean="0"/>
+              <a:t>12-01-2022</a:t>
             </a:fld>
             <a:endParaRPr lang="en-IN"/>
           </a:p>
@@ -5057,6 +5039,7 @@
           <a:p>
             <a:fld id="{66FE3F88-9A3D-48A2-863C-60B6630B7F25}" type="slidenum">
               <a:rPr lang="en-IN" smtClean="0"/>
+              <a:t>‹#›</a:t>
             </a:fld>
             <a:endParaRPr lang="en-IN"/>
           </a:p>
@@ -5126,7 +5109,7 @@
           <p:nvPr/>
         </p:nvPicPr>
         <p:blipFill>
-          <a:blip r:embed="rId3">
+          <a:blip r:embed="rId3" cstate="print">
             <a:extLst>
               <a:ext uri="{28A0092B-C50C-407E-A947-70E740481C1C}">
                 <a14:useLocalDpi xmlns:a14="http://schemas.microsoft.com/office/drawing/2010/main" val="0"/>
@@ -5378,7 +5361,6 @@
               <a:rPr lang="en-US"/>
               <a:t>Click to edit Master text styles</a:t>
             </a:r>
-            <a:endParaRPr lang="en-US"/>
           </a:p>
         </p:txBody>
       </p:sp>
@@ -5399,6 +5381,7 @@
           <a:p>
             <a:fld id="{EEB5FC34-ED1B-4AC7-8A42-C8C65DEFFD02}" type="datetimeFigureOut">
               <a:rPr lang="en-IN" smtClean="0"/>
+              <a:t>12-01-2022</a:t>
             </a:fld>
             <a:endParaRPr lang="en-IN"/>
           </a:p>
@@ -5445,6 +5428,7 @@
           <a:p>
             <a:fld id="{66FE3F88-9A3D-48A2-863C-60B6630B7F25}" type="slidenum">
               <a:rPr lang="en-IN" smtClean="0"/>
+              <a:t>‹#›</a:t>
             </a:fld>
             <a:endParaRPr lang="en-IN"/>
           </a:p>
@@ -5514,7 +5498,7 @@
           <p:nvPr/>
         </p:nvPicPr>
         <p:blipFill>
-          <a:blip r:embed="rId3">
+          <a:blip r:embed="rId3" cstate="print">
             <a:extLst>
               <a:ext uri="{28A0092B-C50C-407E-A947-70E740481C1C}">
                 <a14:useLocalDpi xmlns:a14="http://schemas.microsoft.com/office/drawing/2010/main" val="0"/>
@@ -5662,7 +5646,6 @@
               <a:rPr lang="en-US"/>
               <a:t>Click to edit Master text styles</a:t>
             </a:r>
-            <a:endParaRPr lang="en-US"/>
           </a:p>
           <a:p>
             <a:pPr lvl="1"/>
@@ -5670,7 +5653,6 @@
               <a:rPr lang="en-US"/>
               <a:t>Second level</a:t>
             </a:r>
-            <a:endParaRPr lang="en-US"/>
           </a:p>
           <a:p>
             <a:pPr lvl="2"/>
@@ -5678,7 +5660,6 @@
               <a:rPr lang="en-US"/>
               <a:t>Third level</a:t>
             </a:r>
-            <a:endParaRPr lang="en-US"/>
           </a:p>
           <a:p>
             <a:pPr lvl="3"/>
@@ -5686,7 +5667,6 @@
               <a:rPr lang="en-US"/>
               <a:t>Fourth level</a:t>
             </a:r>
-            <a:endParaRPr lang="en-US"/>
           </a:p>
           <a:p>
             <a:pPr lvl="4"/>
@@ -5723,7 +5703,6 @@
               <a:rPr lang="en-US"/>
               <a:t>Click to edit Master text styles</a:t>
             </a:r>
-            <a:endParaRPr lang="en-US"/>
           </a:p>
           <a:p>
             <a:pPr lvl="1"/>
@@ -5731,7 +5710,6 @@
               <a:rPr lang="en-US"/>
               <a:t>Second level</a:t>
             </a:r>
-            <a:endParaRPr lang="en-US"/>
           </a:p>
           <a:p>
             <a:pPr lvl="2"/>
@@ -5739,7 +5717,6 @@
               <a:rPr lang="en-US"/>
               <a:t>Third level</a:t>
             </a:r>
-            <a:endParaRPr lang="en-US"/>
           </a:p>
           <a:p>
             <a:pPr lvl="3"/>
@@ -5747,7 +5724,6 @@
               <a:rPr lang="en-US"/>
               <a:t>Fourth level</a:t>
             </a:r>
-            <a:endParaRPr lang="en-US"/>
           </a:p>
           <a:p>
             <a:pPr lvl="4"/>
@@ -5776,6 +5752,7 @@
           <a:p>
             <a:fld id="{EEB5FC34-ED1B-4AC7-8A42-C8C65DEFFD02}" type="datetimeFigureOut">
               <a:rPr lang="en-IN" smtClean="0"/>
+              <a:t>12-01-2022</a:t>
             </a:fld>
             <a:endParaRPr lang="en-IN"/>
           </a:p>
@@ -5817,6 +5794,7 @@
           <a:p>
             <a:fld id="{66FE3F88-9A3D-48A2-863C-60B6630B7F25}" type="slidenum">
               <a:rPr lang="en-IN" smtClean="0"/>
+              <a:t>‹#›</a:t>
             </a:fld>
             <a:endParaRPr lang="en-IN"/>
           </a:p>
@@ -5886,7 +5864,7 @@
           <p:nvPr/>
         </p:nvPicPr>
         <p:blipFill>
-          <a:blip r:embed="rId3">
+          <a:blip r:embed="rId3" cstate="print">
             <a:extLst>
               <a:ext uri="{28A0092B-C50C-407E-A947-70E740481C1C}">
                 <a14:useLocalDpi xmlns:a14="http://schemas.microsoft.com/office/drawing/2010/main" val="0"/>
@@ -6076,7 +6054,6 @@
               <a:rPr lang="en-US"/>
               <a:t>Click to edit Master text styles</a:t>
             </a:r>
-            <a:endParaRPr lang="en-US"/>
           </a:p>
         </p:txBody>
       </p:sp>
@@ -6105,7 +6082,6 @@
               <a:rPr lang="en-US"/>
               <a:t>Click to edit Master text styles</a:t>
             </a:r>
-            <a:endParaRPr lang="en-US"/>
           </a:p>
           <a:p>
             <a:pPr lvl="1"/>
@@ -6113,7 +6089,6 @@
               <a:rPr lang="en-US"/>
               <a:t>Second level</a:t>
             </a:r>
-            <a:endParaRPr lang="en-US"/>
           </a:p>
           <a:p>
             <a:pPr lvl="2"/>
@@ -6121,7 +6096,6 @@
               <a:rPr lang="en-US"/>
               <a:t>Third level</a:t>
             </a:r>
-            <a:endParaRPr lang="en-US"/>
           </a:p>
           <a:p>
             <a:pPr lvl="3"/>
@@ -6129,7 +6103,6 @@
               <a:rPr lang="en-US"/>
               <a:t>Fourth level</a:t>
             </a:r>
-            <a:endParaRPr lang="en-US"/>
           </a:p>
           <a:p>
             <a:pPr lvl="4"/>
@@ -6203,7 +6176,6 @@
               <a:rPr lang="en-US"/>
               <a:t>Click to edit Master text styles</a:t>
             </a:r>
-            <a:endParaRPr lang="en-US"/>
           </a:p>
         </p:txBody>
       </p:sp>
@@ -6232,7 +6204,6 @@
               <a:rPr lang="en-US"/>
               <a:t>Click to edit Master text styles</a:t>
             </a:r>
-            <a:endParaRPr lang="en-US"/>
           </a:p>
           <a:p>
             <a:pPr lvl="1"/>
@@ -6240,7 +6211,6 @@
               <a:rPr lang="en-US"/>
               <a:t>Second level</a:t>
             </a:r>
-            <a:endParaRPr lang="en-US"/>
           </a:p>
           <a:p>
             <a:pPr lvl="2"/>
@@ -6248,7 +6218,6 @@
               <a:rPr lang="en-US"/>
               <a:t>Third level</a:t>
             </a:r>
-            <a:endParaRPr lang="en-US"/>
           </a:p>
           <a:p>
             <a:pPr lvl="3"/>
@@ -6256,7 +6225,6 @@
               <a:rPr lang="en-US"/>
               <a:t>Fourth level</a:t>
             </a:r>
-            <a:endParaRPr lang="en-US"/>
           </a:p>
           <a:p>
             <a:pPr lvl="4"/>
@@ -6285,6 +6253,7 @@
           <a:p>
             <a:fld id="{EEB5FC34-ED1B-4AC7-8A42-C8C65DEFFD02}" type="datetimeFigureOut">
               <a:rPr lang="en-IN" smtClean="0"/>
+              <a:t>12-01-2022</a:t>
             </a:fld>
             <a:endParaRPr lang="en-IN"/>
           </a:p>
@@ -6326,6 +6295,7 @@
           <a:p>
             <a:fld id="{66FE3F88-9A3D-48A2-863C-60B6630B7F25}" type="slidenum">
               <a:rPr lang="en-IN" smtClean="0"/>
+              <a:t>‹#›</a:t>
             </a:fld>
             <a:endParaRPr lang="en-IN"/>
           </a:p>
@@ -6395,7 +6365,7 @@
           <p:nvPr/>
         </p:nvPicPr>
         <p:blipFill>
-          <a:blip r:embed="rId3">
+          <a:blip r:embed="rId3" cstate="print">
             <a:extLst>
               <a:ext uri="{28A0092B-C50C-407E-A947-70E740481C1C}">
                 <a14:useLocalDpi xmlns:a14="http://schemas.microsoft.com/office/drawing/2010/main" val="0"/>
@@ -6535,6 +6505,7 @@
           <a:p>
             <a:fld id="{EEB5FC34-ED1B-4AC7-8A42-C8C65DEFFD02}" type="datetimeFigureOut">
               <a:rPr lang="en-IN" smtClean="0"/>
+              <a:t>12-01-2022</a:t>
             </a:fld>
             <a:endParaRPr lang="en-IN"/>
           </a:p>
@@ -6576,6 +6547,7 @@
           <a:p>
             <a:fld id="{66FE3F88-9A3D-48A2-863C-60B6630B7F25}" type="slidenum">
               <a:rPr lang="en-IN" smtClean="0"/>
+              <a:t>‹#›</a:t>
             </a:fld>
             <a:endParaRPr lang="en-IN"/>
           </a:p>
@@ -6615,7 +6587,7 @@
           <p:nvPr/>
         </p:nvPicPr>
         <p:blipFill>
-          <a:blip r:embed="rId2">
+          <a:blip r:embed="rId2" cstate="print">
             <a:extLst>
               <a:ext uri="{28A0092B-C50C-407E-A947-70E740481C1C}">
                 <a14:useLocalDpi xmlns:a14="http://schemas.microsoft.com/office/drawing/2010/main" val="0"/>
@@ -6691,6 +6663,7 @@
           <a:p>
             <a:fld id="{EEB5FC34-ED1B-4AC7-8A42-C8C65DEFFD02}" type="datetimeFigureOut">
               <a:rPr lang="en-IN" smtClean="0"/>
+              <a:t>12-01-2022</a:t>
             </a:fld>
             <a:endParaRPr lang="en-IN"/>
           </a:p>
@@ -6732,6 +6705,7 @@
           <a:p>
             <a:fld id="{66FE3F88-9A3D-48A2-863C-60B6630B7F25}" type="slidenum">
               <a:rPr lang="en-IN" smtClean="0"/>
+              <a:t>‹#›</a:t>
             </a:fld>
             <a:endParaRPr lang="en-IN"/>
           </a:p>
@@ -6801,7 +6775,7 @@
           <p:nvPr/>
         </p:nvPicPr>
         <p:blipFill>
-          <a:blip r:embed="rId3">
+          <a:blip r:embed="rId3" cstate="print">
             <a:extLst>
               <a:ext uri="{28A0092B-C50C-407E-A947-70E740481C1C}">
                 <a14:useLocalDpi xmlns:a14="http://schemas.microsoft.com/office/drawing/2010/main" val="0"/>
@@ -6960,7 +6934,6 @@
               <a:rPr lang="en-US"/>
               <a:t>Click to edit Master text styles</a:t>
             </a:r>
-            <a:endParaRPr lang="en-US"/>
           </a:p>
           <a:p>
             <a:pPr lvl="1"/>
@@ -6968,7 +6941,6 @@
               <a:rPr lang="en-US"/>
               <a:t>Second level</a:t>
             </a:r>
-            <a:endParaRPr lang="en-US"/>
           </a:p>
           <a:p>
             <a:pPr lvl="2"/>
@@ -6976,7 +6948,6 @@
               <a:rPr lang="en-US"/>
               <a:t>Third level</a:t>
             </a:r>
-            <a:endParaRPr lang="en-US"/>
           </a:p>
           <a:p>
             <a:pPr lvl="3"/>
@@ -6984,7 +6955,6 @@
               <a:rPr lang="en-US"/>
               <a:t>Fourth level</a:t>
             </a:r>
-            <a:endParaRPr lang="en-US"/>
           </a:p>
           <a:p>
             <a:pPr lvl="4"/>
@@ -7058,7 +7028,6 @@
               <a:rPr lang="en-US"/>
               <a:t>Click to edit Master text styles</a:t>
             </a:r>
-            <a:endParaRPr lang="en-US"/>
           </a:p>
         </p:txBody>
       </p:sp>
@@ -7079,6 +7048,7 @@
           <a:p>
             <a:fld id="{EEB5FC34-ED1B-4AC7-8A42-C8C65DEFFD02}" type="datetimeFigureOut">
               <a:rPr lang="en-IN" smtClean="0"/>
+              <a:t>12-01-2022</a:t>
             </a:fld>
             <a:endParaRPr lang="en-IN"/>
           </a:p>
@@ -7120,6 +7090,7 @@
           <a:p>
             <a:fld id="{66FE3F88-9A3D-48A2-863C-60B6630B7F25}" type="slidenum">
               <a:rPr lang="en-IN" smtClean="0"/>
+              <a:t>‹#›</a:t>
             </a:fld>
             <a:endParaRPr lang="en-IN"/>
           </a:p>
@@ -7189,7 +7160,7 @@
           <p:nvPr/>
         </p:nvPicPr>
         <p:blipFill>
-          <a:blip r:embed="rId3">
+          <a:blip r:embed="rId3" cstate="print">
             <a:extLst>
               <a:ext uri="{28A0092B-C50C-407E-A947-70E740481C1C}">
                 <a14:useLocalDpi xmlns:a14="http://schemas.microsoft.com/office/drawing/2010/main" val="0"/>
@@ -7461,7 +7432,6 @@
               <a:rPr lang="en-US"/>
               <a:t>Click to edit Master text styles</a:t>
             </a:r>
-            <a:endParaRPr lang="en-US"/>
           </a:p>
         </p:txBody>
       </p:sp>
@@ -7482,6 +7452,7 @@
           <a:p>
             <a:fld id="{EEB5FC34-ED1B-4AC7-8A42-C8C65DEFFD02}" type="datetimeFigureOut">
               <a:rPr lang="en-IN" smtClean="0"/>
+              <a:t>12-01-2022</a:t>
             </a:fld>
             <a:endParaRPr lang="en-IN"/>
           </a:p>
@@ -7523,6 +7494,7 @@
           <a:p>
             <a:fld id="{66FE3F88-9A3D-48A2-863C-60B6630B7F25}" type="slidenum">
               <a:rPr lang="en-IN" smtClean="0"/>
+              <a:t>‹#›</a:t>
             </a:fld>
             <a:endParaRPr lang="en-IN"/>
           </a:p>
@@ -7567,7 +7539,7 @@
           <p:nvPr/>
         </p:nvPicPr>
         <p:blipFill>
-          <a:blip r:embed="rId18">
+          <a:blip r:embed="rId19">
             <a:alphaModFix amt="10000"/>
             <a:extLst>
               <a:ext uri="{28A0092B-C50C-407E-A947-70E740481C1C}">
@@ -7652,7 +7624,6 @@
               <a:rPr lang="en-US"/>
               <a:t>Click to edit Master text styles</a:t>
             </a:r>
-            <a:endParaRPr lang="en-US"/>
           </a:p>
           <a:p>
             <a:pPr lvl="1"/>
@@ -7660,7 +7631,6 @@
               <a:rPr lang="en-US"/>
               <a:t>Second level</a:t>
             </a:r>
-            <a:endParaRPr lang="en-US"/>
           </a:p>
           <a:p>
             <a:pPr lvl="2"/>
@@ -7668,7 +7638,6 @@
               <a:rPr lang="en-US"/>
               <a:t>Third level</a:t>
             </a:r>
-            <a:endParaRPr lang="en-US"/>
           </a:p>
           <a:p>
             <a:pPr lvl="3"/>
@@ -7676,7 +7645,6 @@
               <a:rPr lang="en-US"/>
               <a:t>Fourth level</a:t>
             </a:r>
-            <a:endParaRPr lang="en-US"/>
           </a:p>
           <a:p>
             <a:pPr lvl="4"/>
@@ -7723,6 +7691,7 @@
           <a:p>
             <a:fld id="{EEB5FC34-ED1B-4AC7-8A42-C8C65DEFFD02}" type="datetimeFigureOut">
               <a:rPr lang="en-IN" smtClean="0"/>
+              <a:t>12-01-2022</a:t>
             </a:fld>
             <a:endParaRPr lang="en-IN"/>
           </a:p>
@@ -7800,6 +7769,7 @@
           <a:p>
             <a:fld id="{66FE3F88-9A3D-48A2-863C-60B6630B7F25}" type="slidenum">
               <a:rPr lang="en-IN" smtClean="0"/>
+              <a:t>‹#›</a:t>
             </a:fld>
             <a:endParaRPr lang="en-IN"/>
           </a:p>
@@ -8447,28 +8417,24 @@
               <a:rPr lang="en-US" dirty="0"/>
               <a:t>Startups need funds to start, setup and function</a:t>
             </a:r>
-            <a:endParaRPr lang="en-US" dirty="0"/>
           </a:p>
           <a:p>
             <a:r>
               <a:rPr lang="en-IN" dirty="0"/>
               <a:t>Create a student backed start-up ecosystem</a:t>
             </a:r>
-            <a:endParaRPr lang="en-IN" dirty="0"/>
           </a:p>
           <a:p>
             <a:r>
               <a:rPr lang="en-IN" dirty="0"/>
               <a:t>Students fund student’s projects hence creating a sense of credibility, responsibility and satisfaction</a:t>
             </a:r>
-            <a:endParaRPr lang="en-IN" dirty="0"/>
           </a:p>
           <a:p>
             <a:r>
               <a:rPr lang="en-IN" dirty="0"/>
               <a:t>Technology is evolving, then why should funding be don’t in the same traditional and unreliable manner?</a:t>
             </a:r>
-            <a:endParaRPr lang="en-IN" dirty="0"/>
           </a:p>
           <a:p>
             <a:r>
@@ -8486,7 +8452,6 @@
               <a:rPr lang="en-IN" dirty="0"/>
               <a:t>Smart contracts will help solve the problem of scams, frauds and misuse of power or opportunity</a:t>
             </a:r>
-            <a:endParaRPr lang="en-IN" dirty="0"/>
           </a:p>
           <a:p>
             <a:endParaRPr lang="en-IN" dirty="0"/>
@@ -8576,7 +8541,6 @@
               <a:rPr lang="en-US" dirty="0"/>
               <a:t>The current system of crowdfunding is cumbersome for both the funders and fund raisers, loop holes are present providing opportunities for scam or fraud</a:t>
             </a:r>
-            <a:endParaRPr lang="en-US" dirty="0"/>
           </a:p>
           <a:p>
             <a:pPr algn="just"/>
@@ -8584,7 +8548,6 @@
               <a:rPr lang="en-US" dirty="0"/>
               <a:t>Funders as well as fund raisers loose trust in platforms which causes both these parties to loose money, time and opportunities</a:t>
             </a:r>
-            <a:endParaRPr lang="en-US" dirty="0"/>
           </a:p>
           <a:p>
             <a:pPr algn="just"/>
@@ -8592,7 +8555,6 @@
               <a:rPr lang="en-US" dirty="0"/>
               <a:t>Startups no longer be beholden to the rules, regulations, and whims of the most popular crowdfunding platforms on the internet, it eliminates the problem of fees</a:t>
             </a:r>
-            <a:endParaRPr lang="en-US" dirty="0"/>
           </a:p>
           <a:p>
             <a:pPr algn="just"/>
@@ -8600,7 +8562,6 @@
               <a:rPr lang="en-US" dirty="0"/>
               <a:t>Blockchain-based crowd funders wouldn’t have to worry about the fraud that have plagued modern-day crowdfunding projects as contributors will immediately receive fractional enterprise or product ownership</a:t>
             </a:r>
-            <a:endParaRPr lang="en-US" dirty="0"/>
           </a:p>
           <a:p>
             <a:pPr algn="just"/>
@@ -8608,7 +8569,6 @@
               <a:rPr lang="en-US" dirty="0"/>
               <a:t>Smart contracts would provide built-in milestones that would prevent funds from being released without provenance as to a project or campaign’s legitimacy</a:t>
             </a:r>
-            <a:endParaRPr lang="en-US" dirty="0"/>
           </a:p>
         </p:txBody>
       </p:sp>
@@ -8670,174 +8630,59 @@
             <p:ph idx="1"/>
           </p:nvPr>
         </p:nvSpPr>
-        <p:spPr/>
+        <p:spPr>
+          <a:xfrm>
+            <a:off x="680321" y="2336872"/>
+            <a:ext cx="10438253" cy="4077179"/>
+          </a:xfrm>
+        </p:spPr>
         <p:txBody>
           <a:bodyPr>
-            <a:normAutofit fontScale="62500" lnSpcReduction="20000"/>
+            <a:normAutofit fontScale="70000" lnSpcReduction="20000"/>
           </a:bodyPr>
           <a:lstStyle/>
           <a:p>
-            <a:r>
-              <a:rPr lang="en-US" dirty="0">
-                <a:effectLst/>
-                <a:latin typeface="Arial" panose="020B0604020202020204" pitchFamily="34" charset="0"/>
-              </a:rPr>
-              <a:t>1</a:t>
-            </a:r>
-            <a:br>
+            <a:pPr>
+              <a:lnSpc>
+                <a:spcPct val="120000"/>
+              </a:lnSpc>
+            </a:pPr>
+            <a:r>
               <a:rPr lang="en-US" dirty="0"/>
-            </a:br>
+              <a:t>Role of blockchain technology in crowdfunding (international banking and finance) in 4th international conference on management, economics &amp; finance 2021, In this the author analyzes the role, benefits and set backs of the current crowdfunding systems and also tries to combine crowdfunding with blockchain to generate greater benefits.</a:t>
+            </a:r>
+          </a:p>
+          <a:p>
+            <a:pPr>
+              <a:lnSpc>
+                <a:spcPct val="120000"/>
+              </a:lnSpc>
+            </a:pPr>
             <a:r>
               <a:rPr lang="en-US" dirty="0"/>
-              <a:t>Role of blockchain technology in crowdfunding</a:t>
-            </a:r>
-            <a:br>
+              <a:t>“Crowdfunding and venture capital: substitutes or complements?” the authors in this paper, discuss the dynamics of crowdfunding and contrast venture capitalists and the investors of crowdfunding and understand if they are complimentary in nature.</a:t>
+            </a:r>
+          </a:p>
+          <a:p>
+            <a:pPr>
+              <a:lnSpc>
+                <a:spcPct val="120000"/>
+              </a:lnSpc>
+            </a:pPr>
+            <a:r>
               <a:rPr lang="en-US" dirty="0"/>
-            </a:br>
+              <a:t>“Lemmings in the crowd: success and failure of crowdfunding platforms” In this paper, the author tries to analyze the determinants which make a business a success or a failure, especially the crowdfunding platforms. They have analyzed the case studies of Kickstarter and IndieGoGo in particular.</a:t>
+            </a:r>
+          </a:p>
+          <a:p>
+            <a:pPr>
+              <a:lnSpc>
+                <a:spcPct val="120000"/>
+              </a:lnSpc>
+            </a:pPr>
             <a:r>
               <a:rPr lang="en-US" dirty="0"/>
-              <a:t>(international banking and finance) in 4th international conference ON</a:t>
-            </a:r>
-            <a:endParaRPr lang="en-US" dirty="0"/>
-          </a:p>
-          <a:p>
-            <a:r>
-              <a:rPr lang="en-US" dirty="0"/>
-              <a:t>Management, economics &amp; finance</a:t>
-            </a:r>
-            <a:endParaRPr lang="en-US" dirty="0"/>
-          </a:p>
-          <a:p>
-            <a:r>
-              <a:rPr lang="en-US" dirty="0"/>
-              <a:t>10-12 </a:t>
-            </a:r>
-            <a:r>
-              <a:rPr lang="en-US" dirty="0" err="1"/>
-              <a:t>september</a:t>
-            </a:r>
-            <a:r>
-              <a:rPr lang="en-US" dirty="0"/>
-              <a:t>, 2021</a:t>
-            </a:r>
-            <a:endParaRPr lang="en-US" dirty="0"/>
-          </a:p>
-          <a:p>
-            <a:r>
-              <a:rPr lang="en-US" dirty="0"/>
-              <a:t>1. “Some simple economics of crowdfunding.”1 in this paper, the author walks us through</a:t>
-            </a:r>
-            <a:br>
-              <a:rPr lang="en-US" dirty="0"/>
-            </a:br>
-            <a:r>
-              <a:rPr lang="en-US" dirty="0"/>
-              <a:t>the case study in USA. They provide a preliminary exploration of the underlying economics.</a:t>
-            </a:r>
-            <a:br>
-              <a:rPr lang="en-US" dirty="0"/>
-            </a:br>
-            <a:r>
-              <a:rPr lang="en-US" dirty="0"/>
-              <a:t>They attempted to highlight to which economic theories are applicable.</a:t>
-            </a:r>
-            <a:br>
-              <a:rPr lang="en-US" dirty="0"/>
-            </a:br>
-            <a:r>
-              <a:rPr lang="en-US" dirty="0"/>
-              <a:t>2. “Crowdfunding and venture capital: substitutes or complements?” 2 the authors in this</a:t>
-            </a:r>
-            <a:br>
-              <a:rPr lang="en-US" dirty="0"/>
-            </a:br>
-            <a:r>
-              <a:rPr lang="en-US" dirty="0"/>
-              <a:t>paper, basically attempt to study the dynamics of crowdfunding and if venture capitalists and</a:t>
-            </a:r>
-            <a:br>
-              <a:rPr lang="en-US" dirty="0"/>
-            </a:br>
-            <a:r>
-              <a:rPr lang="en-US" dirty="0"/>
-              <a:t>the investors of crowdfunding are complimentary in nature</a:t>
-            </a:r>
-            <a:endParaRPr lang="en-US" dirty="0"/>
-          </a:p>
-          <a:p>
-            <a:r>
-              <a:rPr lang="en-US" dirty="0"/>
-              <a:t>3. “Lemmings in the crowd: success and failure of crowdfunding platforms”3. In this paper,</a:t>
-            </a:r>
-            <a:br>
-              <a:rPr lang="en-US" dirty="0"/>
-            </a:br>
-            <a:r>
-              <a:rPr lang="en-US" dirty="0"/>
-              <a:t>the author tries to </a:t>
-            </a:r>
-            <a:r>
-              <a:rPr lang="en-US" dirty="0" err="1"/>
-              <a:t>analyse</a:t>
-            </a:r>
-            <a:r>
-              <a:rPr lang="en-US" dirty="0"/>
-              <a:t> the determinants which make a business a success or a failure,</a:t>
-            </a:r>
-            <a:br>
-              <a:rPr lang="en-US" dirty="0"/>
-            </a:br>
-            <a:r>
-              <a:rPr lang="en-US" dirty="0"/>
-              <a:t>especially the crowdfunding platforms. They have </a:t>
-            </a:r>
-            <a:r>
-              <a:rPr lang="en-US" dirty="0" err="1"/>
-              <a:t>analysed</a:t>
-            </a:r>
-            <a:r>
-              <a:rPr lang="en-US" dirty="0"/>
-              <a:t> the case studies of </a:t>
-            </a:r>
-            <a:r>
-              <a:rPr lang="en-US" dirty="0" err="1"/>
-              <a:t>kickstarter</a:t>
-            </a:r>
-            <a:r>
-              <a:rPr lang="en-US" dirty="0"/>
-              <a:t> and</a:t>
-            </a:r>
-            <a:br>
-              <a:rPr lang="en-US" dirty="0"/>
-            </a:br>
-            <a:r>
-              <a:rPr lang="en-US" dirty="0" err="1"/>
-              <a:t>indiegogo</a:t>
-            </a:r>
-            <a:r>
-              <a:rPr lang="en-US" dirty="0"/>
-              <a:t> in particular.</a:t>
-            </a:r>
-            <a:br>
-              <a:rPr lang="en-US" dirty="0"/>
-            </a:br>
-            <a:r>
-              <a:rPr lang="en-US" dirty="0"/>
-              <a:t>4. “How blockchain is revolutionizing crowdfunding”4. In this paper, the author explains</a:t>
-            </a:r>
-            <a:br>
-              <a:rPr lang="en-US" dirty="0"/>
-            </a:br>
-            <a:r>
-              <a:rPr lang="en-US" dirty="0"/>
-              <a:t>the limitations of the crowdfunding platforms and the benefits of blockchain technology and</a:t>
-            </a:r>
-            <a:br>
-              <a:rPr lang="en-US" dirty="0"/>
-            </a:br>
-            <a:r>
-              <a:rPr lang="en-US" dirty="0"/>
-              <a:t>how it is the future of crowdfunding owing to the ease and transparency of this model.</a:t>
+              <a:t>“How blockchain is revolutionizing crowdfunding” In this paper, the author explains the limitations of the crowdfunding platforms and the benefits of blockchain technology and how it is the future of crowdfunding owing to the ease and transparency of this model.</a:t>
             </a:r>
             <a:endParaRPr lang="en-IN" dirty="0"/>
           </a:p>
@@ -8907,38 +8752,41 @@
           <a:lstStyle/>
           <a:p>
             <a:r>
-              <a:rPr lang="en-IN"/>
+              <a:rPr lang="en-IN" dirty="0"/>
               <a:t>Lack of accountability in both directions.</a:t>
             </a:r>
-            <a:endParaRPr lang="en-IN"/>
-          </a:p>
-          <a:p>
-            <a:r>
-              <a:rPr lang="en-IN"/>
+          </a:p>
+          <a:p>
+            <a:r>
+              <a:rPr lang="en-IN" dirty="0"/>
               <a:t>Lack of customisation in advertising and marketing.</a:t>
             </a:r>
-            <a:endParaRPr lang="en-IN"/>
-          </a:p>
-          <a:p>
-            <a:r>
-              <a:rPr lang="en-IN"/>
+          </a:p>
+          <a:p>
+            <a:r>
+              <a:rPr lang="en-IN" dirty="0"/>
               <a:t>Lack of IP Security.</a:t>
             </a:r>
-            <a:endParaRPr lang="en-IN"/>
-          </a:p>
-          <a:p>
-            <a:r>
-              <a:rPr lang="en-IN"/>
-              <a:t>The exorbidant and unnecessary fees charged by existing systems.</a:t>
-            </a:r>
-            <a:endParaRPr lang="en-IN"/>
-          </a:p>
-          <a:p>
-            <a:r>
-              <a:rPr lang="en-IN"/>
+          </a:p>
+          <a:p>
+            <a:r>
+              <a:rPr lang="en-IN" dirty="0"/>
+              <a:t>The </a:t>
+            </a:r>
+            <a:r>
+              <a:rPr lang="en-IN" dirty="0" err="1"/>
+              <a:t>exorbidant</a:t>
+            </a:r>
+            <a:r>
+              <a:rPr lang="en-IN" dirty="0"/>
+              <a:t> and unnecessary fees charged by existing systems.</a:t>
+            </a:r>
+          </a:p>
+          <a:p>
+            <a:r>
+              <a:rPr lang="en-IN" dirty="0"/>
               <a:t>Lack of flexibility in rules for extant platforms.</a:t>
             </a:r>
-            <a:endParaRPr lang="en-IN"/>
           </a:p>
         </p:txBody>
       </p:sp>
@@ -9009,14 +8857,12 @@
               <a:rPr lang="en-IN"/>
               <a:t>Increase accountability of startups and investors.</a:t>
             </a:r>
-            <a:endParaRPr lang="en-IN"/>
           </a:p>
           <a:p>
             <a:r>
               <a:rPr lang="en-IN"/>
               <a:t>Give creators control over the way they wish the product be advertised.</a:t>
             </a:r>
-            <a:endParaRPr lang="en-IN"/>
           </a:p>
           <a:p>
             <a:r>
@@ -9113,7 +8959,16 @@
           <a:bodyPr/>
           <a:lstStyle/>
           <a:p>
-            <a:endParaRPr lang="en-IN"/>
+            <a:r>
+              <a:rPr lang="en-US" dirty="0"/>
+              <a:t>We will be using smart contracts using the blockchain technology and create a process that will form the backbone for our application and ensure the crowdfunding process is accurate, efficient, transparent and secure.</a:t>
+            </a:r>
+          </a:p>
+          <a:p>
+            <a:r>
+              <a:rPr lang="en-IN" dirty="0"/>
+              <a:t>With the help of the smart contract we will be able to determine and execute actions once the required conditions will be met, and we will also have a fallback process in case the conditions are not met which hence will ensure that opportunities for fraud is minimized.</a:t>
+            </a:r>
           </a:p>
         </p:txBody>
       </p:sp>
@@ -9177,10 +9032,59 @@
         </p:nvSpPr>
         <p:spPr/>
         <p:txBody>
-          <a:bodyPr/>
+          <a:bodyPr>
+            <a:normAutofit lnSpcReduction="10000"/>
+          </a:bodyPr>
           <a:lstStyle/>
           <a:p>
+            <a:r>
+              <a:rPr lang="en-US" dirty="0"/>
+              <a:t>Blockchain, Web 3.0 and decentralization are the future and the scope of this project can only grow.</a:t>
+            </a:r>
             <a:endParaRPr lang="en-IN" dirty="0"/>
+          </a:p>
+          <a:p>
+            <a:r>
+              <a:rPr lang="en-US" dirty="0"/>
+              <a:t>Our project can be extended as </a:t>
+            </a:r>
+          </a:p>
+          <a:p>
+            <a:pPr lvl="1"/>
+            <a:r>
+              <a:rPr lang="en-US" dirty="0"/>
+              <a:t>A full stack crowdfunding application(like for our college)</a:t>
+            </a:r>
+          </a:p>
+          <a:p>
+            <a:pPr lvl="1"/>
+            <a:r>
+              <a:rPr lang="en-US" dirty="0"/>
+              <a:t>A supply chain tracking application</a:t>
+            </a:r>
+          </a:p>
+          <a:p>
+            <a:pPr lvl="1"/>
+            <a:r>
+              <a:rPr lang="en-US" dirty="0"/>
+              <a:t>A peer-to-peer trading/exchange platform (like OLX, etc.)</a:t>
+            </a:r>
+          </a:p>
+          <a:p>
+            <a:pPr lvl="1"/>
+            <a:r>
+              <a:rPr lang="en-US" dirty="0"/>
+              <a:t>A food supply tracking application</a:t>
+            </a:r>
+          </a:p>
+          <a:p>
+            <a:r>
+              <a:rPr lang="en-US" dirty="0"/>
+              <a:t>Blockchain as  a technology can be implemented in any application where there is a need for tracking, transaction, data storage, trading, data transfer and many more…</a:t>
+            </a:r>
+          </a:p>
+          <a:p>
+            <a:endParaRPr lang="en-US" dirty="0"/>
           </a:p>
         </p:txBody>
       </p:sp>
@@ -9548,6 +9452,8 @@
       </a:bgFillStyleLst>
     </a:fmtScheme>
   </a:themeElements>
+  <a:objectDefaults/>
+  <a:extraClrSchemeLst/>
   <a:extLst>
     <a:ext uri="{05A4C25C-085E-4340-85A3-A5531E510DB2}">
       <thm15:themeFamily xmlns:thm15="http://schemas.microsoft.com/office/thememl/2012/main" name="Office Theme" id="{62F939B6-93AF-4DB8-9C6B-D6C7DFDC589F}" vid="{4A3C46E8-61CC-4603-A589-7422A47A8E4A}"/>
@@ -9807,6 +9713,8 @@
       </a:bgFillStyleLst>
     </a:fmtScheme>
   </a:themeElements>
+  <a:objectDefaults/>
+  <a:extraClrSchemeLst/>
   <a:extLst>
     <a:ext uri="{05A4C25C-085E-4340-85A3-A5531E510DB2}">
       <thm15:themeFamily xmlns:thm15="http://schemas.microsoft.com/office/thememl/2012/main" name="Office Theme" id="{62F939B6-93AF-4DB8-9C6B-D6C7DFDC589F}" vid="{4A3C46E8-61CC-4603-A589-7422A47A8E4A}"/>

</xml_diff>